<commit_message>
Lecture4: type cast operators overloading and minor fixes
</commit_message>
<xml_diff>
--- a/pt1/lectures/lecture4/lecture4.pptx
+++ b/pt1/lectures/lecture4/lecture4.pptx
@@ -16,6 +16,7 @@
     <p:sldId id="261" r:id="rId10"/>
     <p:sldId id="265" r:id="rId11"/>
     <p:sldId id="266" r:id="rId12"/>
+    <p:sldId id="267" r:id="rId13"/>
   </p:sldIdLst>
   <p:sldSz cx="12192000" cy="6858000"/>
   <p:notesSz cx="6858000" cy="9144000"/>
@@ -845,7 +846,7 @@
             <a:fld id="{B61BEF0D-F0BB-DE4B-95CE-6DB70DBA9567}" type="datetimeFigureOut">
               <a:rPr lang="en-US" dirty="0"/>
               <a:pPr/>
-              <a:t>3/18/2022</a:t>
+              <a:t>4/6/2022</a:t>
             </a:fld>
             <a:endParaRPr lang="en-US" dirty="0"/>
           </a:p>
@@ -1093,7 +1094,7 @@
             <a:fld id="{B61BEF0D-F0BB-DE4B-95CE-6DB70DBA9567}" type="datetimeFigureOut">
               <a:rPr lang="en-US" dirty="0"/>
               <a:pPr/>
-              <a:t>3/18/2022</a:t>
+              <a:t>4/6/2022</a:t>
             </a:fld>
             <a:endParaRPr lang="en-US" dirty="0"/>
           </a:p>
@@ -1404,7 +1405,7 @@
             <a:fld id="{B61BEF0D-F0BB-DE4B-95CE-6DB70DBA9567}" type="datetimeFigureOut">
               <a:rPr lang="en-US" dirty="0"/>
               <a:pPr/>
-              <a:t>3/18/2022</a:t>
+              <a:t>4/6/2022</a:t>
             </a:fld>
             <a:endParaRPr lang="en-US" dirty="0"/>
           </a:p>
@@ -1742,7 +1743,7 @@
             <a:fld id="{B61BEF0D-F0BB-DE4B-95CE-6DB70DBA9567}" type="datetimeFigureOut">
               <a:rPr lang="en-US" dirty="0"/>
               <a:pPr/>
-              <a:t>3/18/2022</a:t>
+              <a:t>4/6/2022</a:t>
             </a:fld>
             <a:endParaRPr lang="en-US" dirty="0"/>
           </a:p>
@@ -2053,7 +2054,7 @@
             <a:fld id="{B61BEF0D-F0BB-DE4B-95CE-6DB70DBA9567}" type="datetimeFigureOut">
               <a:rPr lang="en-US" dirty="0"/>
               <a:pPr/>
-              <a:t>3/18/2022</a:t>
+              <a:t>4/6/2022</a:t>
             </a:fld>
             <a:endParaRPr lang="en-US" dirty="0"/>
           </a:p>
@@ -2443,7 +2444,7 @@
             <a:fld id="{B61BEF0D-F0BB-DE4B-95CE-6DB70DBA9567}" type="datetimeFigureOut">
               <a:rPr lang="en-US" dirty="0"/>
               <a:pPr/>
-              <a:t>3/18/2022</a:t>
+              <a:t>4/6/2022</a:t>
             </a:fld>
             <a:endParaRPr lang="en-US" dirty="0"/>
           </a:p>
@@ -2609,7 +2610,7 @@
           <a:p>
             <a:fld id="{55C6B4A9-1611-4792-9094-5F34BCA07E0B}" type="datetimeFigureOut">
               <a:rPr lang="en-US" dirty="0"/>
-              <a:t>3/18/2022</a:t>
+              <a:t>4/6/2022</a:t>
             </a:fld>
             <a:endParaRPr lang="en-US" dirty="0"/>
           </a:p>
@@ -2785,7 +2786,7 @@
             <a:fld id="{B61BEF0D-F0BB-DE4B-95CE-6DB70DBA9567}" type="datetimeFigureOut">
               <a:rPr lang="en-US" dirty="0"/>
               <a:pPr/>
-              <a:t>3/18/2022</a:t>
+              <a:t>4/6/2022</a:t>
             </a:fld>
             <a:endParaRPr lang="en-US" dirty="0"/>
           </a:p>
@@ -2958,7 +2959,7 @@
             <a:fld id="{B61BEF0D-F0BB-DE4B-95CE-6DB70DBA9567}" type="datetimeFigureOut">
               <a:rPr lang="en-US" dirty="0"/>
               <a:pPr/>
-              <a:t>3/18/2022</a:t>
+              <a:t>4/6/2022</a:t>
             </a:fld>
             <a:endParaRPr lang="en-US" dirty="0"/>
           </a:p>
@@ -3202,7 +3203,7 @@
             <a:fld id="{B61BEF0D-F0BB-DE4B-95CE-6DB70DBA9567}" type="datetimeFigureOut">
               <a:rPr lang="en-US" dirty="0"/>
               <a:pPr/>
-              <a:t>3/18/2022</a:t>
+              <a:t>4/6/2022</a:t>
             </a:fld>
             <a:endParaRPr lang="en-US" dirty="0"/>
           </a:p>
@@ -3430,7 +3431,7 @@
           <a:p>
             <a:fld id="{EB712588-04B1-427B-82EE-E8DB90309F08}" type="datetimeFigureOut">
               <a:rPr lang="en-US" dirty="0"/>
-              <a:t>3/18/2022</a:t>
+              <a:t>4/6/2022</a:t>
             </a:fld>
             <a:endParaRPr lang="en-US" dirty="0"/>
           </a:p>
@@ -3800,7 +3801,7 @@
             <a:fld id="{B61BEF0D-F0BB-DE4B-95CE-6DB70DBA9567}" type="datetimeFigureOut">
               <a:rPr lang="en-US" dirty="0"/>
               <a:pPr/>
-              <a:t>3/18/2022</a:t>
+              <a:t>4/6/2022</a:t>
             </a:fld>
             <a:endParaRPr lang="en-US" dirty="0"/>
           </a:p>
@@ -3920,7 +3921,7 @@
             <a:fld id="{B61BEF0D-F0BB-DE4B-95CE-6DB70DBA9567}" type="datetimeFigureOut">
               <a:rPr lang="en-US" dirty="0"/>
               <a:pPr/>
-              <a:t>3/18/2022</a:t>
+              <a:t>4/6/2022</a:t>
             </a:fld>
             <a:endParaRPr lang="en-US" dirty="0"/>
           </a:p>
@@ -4012,7 +4013,7 @@
             <a:fld id="{B61BEF0D-F0BB-DE4B-95CE-6DB70DBA9567}" type="datetimeFigureOut">
               <a:rPr lang="en-US" dirty="0"/>
               <a:pPr/>
-              <a:t>3/18/2022</a:t>
+              <a:t>4/6/2022</a:t>
             </a:fld>
             <a:endParaRPr lang="en-US" dirty="0"/>
           </a:p>
@@ -4263,7 +4264,7 @@
           <a:p>
             <a:fld id="{42A54C80-263E-416B-A8E0-580EDEADCBDC}" type="datetimeFigureOut">
               <a:rPr lang="en-US" dirty="0"/>
-              <a:t>3/18/2022</a:t>
+              <a:t>4/6/2022</a:t>
             </a:fld>
             <a:endParaRPr lang="en-US" dirty="0"/>
           </a:p>
@@ -4522,7 +4523,7 @@
             <a:fld id="{B61BEF0D-F0BB-DE4B-95CE-6DB70DBA9567}" type="datetimeFigureOut">
               <a:rPr lang="en-US" dirty="0"/>
               <a:pPr/>
-              <a:t>3/18/2022</a:t>
+              <a:t>4/6/2022</a:t>
             </a:fld>
             <a:endParaRPr lang="en-US" dirty="0"/>
           </a:p>
@@ -5262,7 +5263,7 @@
             <a:fld id="{B61BEF0D-F0BB-DE4B-95CE-6DB70DBA9567}" type="datetimeFigureOut">
               <a:rPr lang="en-US" dirty="0"/>
               <a:pPr/>
-              <a:t>3/18/2022</a:t>
+              <a:t>4/6/2022</a:t>
             </a:fld>
             <a:endParaRPr lang="en-US" dirty="0"/>
           </a:p>
@@ -5787,7 +5788,7 @@
           <p:cNvPr id="2" name="Title 1">
             <a:extLst>
               <a:ext uri="{FF2B5EF4-FFF2-40B4-BE49-F238E27FC236}">
-                <a16:creationId xmlns="" xmlns:a16="http://schemas.microsoft.com/office/drawing/2014/main" id="{78F05172-2BB6-4969-9FAE-01AFF727CD79}"/>
+                <a16:creationId xmlns:a16="http://schemas.microsoft.com/office/drawing/2014/main" xmlns="" id="{78F05172-2BB6-4969-9FAE-01AFF727CD79}"/>
               </a:ext>
             </a:extLst>
           </p:cNvPr>
@@ -5830,7 +5831,7 @@
           <p:cNvPr id="3" name="Subtitle 2">
             <a:extLst>
               <a:ext uri="{FF2B5EF4-FFF2-40B4-BE49-F238E27FC236}">
-                <a16:creationId xmlns="" xmlns:a16="http://schemas.microsoft.com/office/drawing/2014/main" id="{ABC375FB-063E-45BF-8E88-AAABE78825F5}"/>
+                <a16:creationId xmlns:a16="http://schemas.microsoft.com/office/drawing/2014/main" xmlns="" id="{ABC375FB-063E-45BF-8E88-AAABE78825F5}"/>
               </a:ext>
             </a:extLst>
           </p:cNvPr>
@@ -6022,7 +6023,7 @@
           <p:cNvPr id="4" name="Title 1">
             <a:extLst>
               <a:ext uri="{FF2B5EF4-FFF2-40B4-BE49-F238E27FC236}">
-                <a16:creationId xmlns="" xmlns:a16="http://schemas.microsoft.com/office/drawing/2014/main" id="{C9F3A54F-2754-468D-BEEC-B4EED9A8CD41}"/>
+                <a16:creationId xmlns:a16="http://schemas.microsoft.com/office/drawing/2014/main" xmlns="" id="{C9F3A54F-2754-468D-BEEC-B4EED9A8CD41}"/>
               </a:ext>
             </a:extLst>
           </p:cNvPr>
@@ -6819,7 +6820,7 @@
           <p:cNvPr id="4" name="Title 1">
             <a:extLst>
               <a:ext uri="{FF2B5EF4-FFF2-40B4-BE49-F238E27FC236}">
-                <a16:creationId xmlns="" xmlns:a16="http://schemas.microsoft.com/office/drawing/2014/main" id="{C9F3A54F-2754-468D-BEEC-B4EED9A8CD41}"/>
+                <a16:creationId xmlns:a16="http://schemas.microsoft.com/office/drawing/2014/main" xmlns="" id="{C9F3A54F-2754-468D-BEEC-B4EED9A8CD41}"/>
               </a:ext>
             </a:extLst>
           </p:cNvPr>
@@ -7282,6 +7283,1166 @@
     <p:extLst>
       <p:ext uri="{BB962C8B-B14F-4D97-AF65-F5344CB8AC3E}">
         <p14:creationId xmlns:p14="http://schemas.microsoft.com/office/powerpoint/2010/main" val="1978333885"/>
+      </p:ext>
+    </p:extLst>
+  </p:cSld>
+  <p:clrMapOvr>
+    <a:masterClrMapping/>
+  </p:clrMapOvr>
+</p:sld>
+</file>
+
+<file path=ppt/slides/slide12.xml><?xml version="1.0" encoding="utf-8"?>
+<p:sld xmlns:a="http://schemas.openxmlformats.org/drawingml/2006/main" xmlns:r="http://schemas.openxmlformats.org/officeDocument/2006/relationships" xmlns:p="http://schemas.openxmlformats.org/presentationml/2006/main">
+  <p:cSld>
+    <p:spTree>
+      <p:nvGrpSpPr>
+        <p:cNvPr id="1" name=""/>
+        <p:cNvGrpSpPr/>
+        <p:nvPr/>
+      </p:nvGrpSpPr>
+      <p:grpSpPr>
+        <a:xfrm>
+          <a:off x="0" y="0"/>
+          <a:ext cx="0" cy="0"/>
+          <a:chOff x="0" y="0"/>
+          <a:chExt cx="0" cy="0"/>
+        </a:xfrm>
+      </p:grpSpPr>
+      <p:sp>
+        <p:nvSpPr>
+          <p:cNvPr id="3" name="Объект 2"/>
+          <p:cNvSpPr>
+            <a:spLocks noGrp="1"/>
+          </p:cNvSpPr>
+          <p:nvPr>
+            <p:ph idx="1"/>
+          </p:nvPr>
+        </p:nvSpPr>
+        <p:spPr>
+          <a:xfrm>
+            <a:off x="7178041" y="990157"/>
+            <a:ext cx="4611505" cy="2201099"/>
+          </a:xfrm>
+          <a:solidFill>
+            <a:schemeClr val="bg1"/>
+          </a:solidFill>
+        </p:spPr>
+        <p:txBody>
+          <a:bodyPr>
+            <a:normAutofit lnSpcReduction="10000"/>
+          </a:bodyPr>
+          <a:lstStyle/>
+          <a:p>
+            <a:r>
+              <a:rPr lang="en-US" sz="1600" dirty="0" smtClean="0"/>
+              <a:t>(1) </a:t>
+            </a:r>
+            <a:r>
+              <a:rPr lang="ru-RU" sz="1600" dirty="0" smtClean="0"/>
+              <a:t>и </a:t>
+            </a:r>
+            <a:r>
+              <a:rPr lang="en-US" sz="1600" dirty="0" smtClean="0"/>
+              <a:t>(2) </a:t>
+            </a:r>
+            <a:r>
+              <a:rPr lang="ru-RU" sz="1600" dirty="0" smtClean="0"/>
+              <a:t>генерируют исключение </a:t>
+            </a:r>
+            <a:r>
+              <a:rPr lang="en-US" sz="1600" dirty="0" err="1" smtClean="0"/>
+              <a:t>std</a:t>
+            </a:r>
+            <a:r>
+              <a:rPr lang="en-US" sz="1600" dirty="0" smtClean="0"/>
+              <a:t>::</a:t>
+            </a:r>
+            <a:r>
+              <a:rPr lang="en-US" sz="1600" dirty="0" err="1" smtClean="0"/>
+              <a:t>bad_alloc</a:t>
+            </a:r>
+            <a:r>
+              <a:rPr lang="en-US" sz="1600" dirty="0" smtClean="0"/>
+              <a:t>, </a:t>
+            </a:r>
+            <a:r>
+              <a:rPr lang="ru-RU" sz="1600" dirty="0" smtClean="0"/>
+              <a:t>если выделить запрошенную память невозможно</a:t>
+            </a:r>
+          </a:p>
+          <a:p>
+            <a:r>
+              <a:rPr lang="ru-RU" sz="1600" dirty="0" smtClean="0"/>
+              <a:t>(3) и (4) в этом случае возвращают </a:t>
+            </a:r>
+            <a:r>
+              <a:rPr lang="en-US" sz="1600" dirty="0" err="1" smtClean="0"/>
+              <a:t>nullptr</a:t>
+            </a:r>
+            <a:r>
+              <a:rPr lang="en-US" sz="1600" dirty="0" smtClean="0"/>
+              <a:t> (non-throwing new)</a:t>
+            </a:r>
+          </a:p>
+          <a:p>
+            <a:r>
+              <a:rPr lang="ru-RU" sz="1600" dirty="0" smtClean="0"/>
+              <a:t>Операторы (2) – (4), как правило, используют оператор (1), поэтому достаточно перегрузить (1)</a:t>
+            </a:r>
+          </a:p>
+        </p:txBody>
+      </p:sp>
+      <p:sp>
+        <p:nvSpPr>
+          <p:cNvPr id="4" name="Title 1">
+            <a:extLst>
+              <a:ext uri="{FF2B5EF4-FFF2-40B4-BE49-F238E27FC236}">
+                <a16:creationId xmlns:a16="http://schemas.microsoft.com/office/drawing/2014/main" xmlns="" id="{C9F3A54F-2754-468D-BEEC-B4EED9A8CD41}"/>
+              </a:ext>
+            </a:extLst>
+          </p:cNvPr>
+          <p:cNvSpPr>
+            <a:spLocks noGrp="1"/>
+          </p:cNvSpPr>
+          <p:nvPr>
+            <p:ph type="title"/>
+          </p:nvPr>
+        </p:nvSpPr>
+        <p:spPr>
+          <a:xfrm>
+            <a:off x="488271" y="164882"/>
+            <a:ext cx="11301275" cy="672661"/>
+          </a:xfrm>
+          <a:solidFill>
+            <a:schemeClr val="bg1"/>
+          </a:solidFill>
+          <a:ln>
+            <a:solidFill>
+              <a:schemeClr val="tx1"/>
+            </a:solidFill>
+          </a:ln>
+        </p:spPr>
+        <p:txBody>
+          <a:bodyPr>
+            <a:noAutofit/>
+          </a:bodyPr>
+          <a:lstStyle/>
+          <a:p>
+            <a:pPr algn="ctr"/>
+            <a:r>
+              <a:rPr lang="ru-RU" sz="2800" dirty="0" smtClean="0"/>
+              <a:t>Перегрузка </a:t>
+            </a:r>
+            <a:r>
+              <a:rPr lang="ru-RU" sz="2800" dirty="0" smtClean="0"/>
+              <a:t>глобальных операторов </a:t>
+            </a:r>
+            <a:r>
+              <a:rPr lang="en-US" sz="2800" dirty="0" smtClean="0"/>
+              <a:t>new </a:t>
+            </a:r>
+            <a:r>
+              <a:rPr lang="ru-RU" sz="2800" dirty="0" smtClean="0"/>
+              <a:t>и </a:t>
+            </a:r>
+            <a:r>
+              <a:rPr lang="en-US" sz="2800" dirty="0" smtClean="0"/>
+              <a:t>delete</a:t>
+            </a:r>
+            <a:endParaRPr lang="en-US" sz="2800" dirty="0"/>
+          </a:p>
+        </p:txBody>
+      </p:sp>
+      <p:pic>
+        <p:nvPicPr>
+          <p:cNvPr id="5" name="Рисунок 4"/>
+          <p:cNvPicPr>
+            <a:picLocks noChangeAspect="1"/>
+          </p:cNvPicPr>
+          <p:nvPr/>
+        </p:nvPicPr>
+        <p:blipFill>
+          <a:blip r:embed="rId2"/>
+          <a:stretch>
+            <a:fillRect/>
+          </a:stretch>
+        </p:blipFill>
+        <p:spPr>
+          <a:xfrm>
+            <a:off x="720512" y="1094273"/>
+            <a:ext cx="6327648" cy="1084516"/>
+          </a:xfrm>
+          <a:prstGeom prst="rect">
+            <a:avLst/>
+          </a:prstGeom>
+        </p:spPr>
+      </p:pic>
+      <p:sp>
+        <p:nvSpPr>
+          <p:cNvPr id="6" name="TextBox 5"/>
+          <p:cNvSpPr txBox="1"/>
+          <p:nvPr/>
+        </p:nvSpPr>
+        <p:spPr>
+          <a:xfrm>
+            <a:off x="488273" y="1106022"/>
+            <a:ext cx="232239" cy="307777"/>
+          </a:xfrm>
+          <a:prstGeom prst="rect">
+            <a:avLst/>
+          </a:prstGeom>
+          <a:noFill/>
+        </p:spPr>
+        <p:txBody>
+          <a:bodyPr wrap="square" rtlCol="0">
+            <a:spAutoFit/>
+          </a:bodyPr>
+          <a:lstStyle/>
+          <a:p>
+            <a:r>
+              <a:rPr lang="en-US" sz="1400" dirty="0" smtClean="0"/>
+              <a:t>1</a:t>
+            </a:r>
+            <a:endParaRPr lang="en-US" sz="1400" dirty="0"/>
+          </a:p>
+        </p:txBody>
+      </p:sp>
+      <p:sp>
+        <p:nvSpPr>
+          <p:cNvPr id="7" name="TextBox 6"/>
+          <p:cNvSpPr txBox="1"/>
+          <p:nvPr/>
+        </p:nvSpPr>
+        <p:spPr>
+          <a:xfrm>
+            <a:off x="488272" y="1377508"/>
+            <a:ext cx="232239" cy="307777"/>
+          </a:xfrm>
+          <a:prstGeom prst="rect">
+            <a:avLst/>
+          </a:prstGeom>
+          <a:noFill/>
+        </p:spPr>
+        <p:txBody>
+          <a:bodyPr wrap="square" rtlCol="0">
+            <a:spAutoFit/>
+          </a:bodyPr>
+          <a:lstStyle/>
+          <a:p>
+            <a:r>
+              <a:rPr lang="en-US" sz="1400" dirty="0" smtClean="0"/>
+              <a:t>2</a:t>
+            </a:r>
+            <a:endParaRPr lang="en-US" sz="1400" dirty="0"/>
+          </a:p>
+        </p:txBody>
+      </p:sp>
+      <p:sp>
+        <p:nvSpPr>
+          <p:cNvPr id="8" name="TextBox 7"/>
+          <p:cNvSpPr txBox="1"/>
+          <p:nvPr/>
+        </p:nvSpPr>
+        <p:spPr>
+          <a:xfrm>
+            <a:off x="488271" y="1631037"/>
+            <a:ext cx="232239" cy="307777"/>
+          </a:xfrm>
+          <a:prstGeom prst="rect">
+            <a:avLst/>
+          </a:prstGeom>
+          <a:noFill/>
+        </p:spPr>
+        <p:txBody>
+          <a:bodyPr wrap="square" rtlCol="0">
+            <a:spAutoFit/>
+          </a:bodyPr>
+          <a:lstStyle/>
+          <a:p>
+            <a:r>
+              <a:rPr lang="en-US" sz="1400" dirty="0" smtClean="0"/>
+              <a:t>3</a:t>
+            </a:r>
+            <a:endParaRPr lang="en-US" sz="1400" dirty="0"/>
+          </a:p>
+        </p:txBody>
+      </p:sp>
+      <p:sp>
+        <p:nvSpPr>
+          <p:cNvPr id="9" name="TextBox 8"/>
+          <p:cNvSpPr txBox="1"/>
+          <p:nvPr/>
+        </p:nvSpPr>
+        <p:spPr>
+          <a:xfrm>
+            <a:off x="488271" y="1871012"/>
+            <a:ext cx="232239" cy="307777"/>
+          </a:xfrm>
+          <a:prstGeom prst="rect">
+            <a:avLst/>
+          </a:prstGeom>
+          <a:noFill/>
+        </p:spPr>
+        <p:txBody>
+          <a:bodyPr wrap="square" rtlCol="0">
+            <a:spAutoFit/>
+          </a:bodyPr>
+          <a:lstStyle/>
+          <a:p>
+            <a:r>
+              <a:rPr lang="en-US" sz="1400" dirty="0" smtClean="0"/>
+              <a:t>4</a:t>
+            </a:r>
+            <a:endParaRPr lang="en-US" sz="1400" dirty="0"/>
+          </a:p>
+        </p:txBody>
+      </p:sp>
+      <p:pic>
+        <p:nvPicPr>
+          <p:cNvPr id="10" name="Рисунок 9"/>
+          <p:cNvPicPr>
+            <a:picLocks noChangeAspect="1"/>
+          </p:cNvPicPr>
+          <p:nvPr/>
+        </p:nvPicPr>
+        <p:blipFill rotWithShape="1">
+          <a:blip r:embed="rId3"/>
+          <a:srcRect b="7746"/>
+          <a:stretch/>
+        </p:blipFill>
+        <p:spPr>
+          <a:xfrm>
+            <a:off x="714176" y="3565826"/>
+            <a:ext cx="6023236" cy="1415844"/>
+          </a:xfrm>
+          <a:prstGeom prst="rect">
+            <a:avLst/>
+          </a:prstGeom>
+        </p:spPr>
+      </p:pic>
+      <p:sp>
+        <p:nvSpPr>
+          <p:cNvPr id="11" name="TextBox 10"/>
+          <p:cNvSpPr txBox="1"/>
+          <p:nvPr/>
+        </p:nvSpPr>
+        <p:spPr>
+          <a:xfrm>
+            <a:off x="481937" y="3649500"/>
+            <a:ext cx="232239" cy="307777"/>
+          </a:xfrm>
+          <a:prstGeom prst="rect">
+            <a:avLst/>
+          </a:prstGeom>
+          <a:noFill/>
+        </p:spPr>
+        <p:txBody>
+          <a:bodyPr wrap="square" rtlCol="0">
+            <a:spAutoFit/>
+          </a:bodyPr>
+          <a:lstStyle/>
+          <a:p>
+            <a:r>
+              <a:rPr lang="en-US" sz="1400" dirty="0" smtClean="0"/>
+              <a:t>1</a:t>
+            </a:r>
+            <a:endParaRPr lang="en-US" sz="1400" dirty="0"/>
+          </a:p>
+        </p:txBody>
+      </p:sp>
+      <p:sp>
+        <p:nvSpPr>
+          <p:cNvPr id="12" name="TextBox 11"/>
+          <p:cNvSpPr txBox="1"/>
+          <p:nvPr/>
+        </p:nvSpPr>
+        <p:spPr>
+          <a:xfrm>
+            <a:off x="481937" y="3869968"/>
+            <a:ext cx="232239" cy="307777"/>
+          </a:xfrm>
+          <a:prstGeom prst="rect">
+            <a:avLst/>
+          </a:prstGeom>
+          <a:noFill/>
+        </p:spPr>
+        <p:txBody>
+          <a:bodyPr wrap="square" rtlCol="0">
+            <a:spAutoFit/>
+          </a:bodyPr>
+          <a:lstStyle/>
+          <a:p>
+            <a:r>
+              <a:rPr lang="en-US" sz="1400" dirty="0" smtClean="0"/>
+              <a:t>2</a:t>
+            </a:r>
+            <a:endParaRPr lang="en-US" sz="1400" dirty="0"/>
+          </a:p>
+        </p:txBody>
+      </p:sp>
+      <p:sp>
+        <p:nvSpPr>
+          <p:cNvPr id="13" name="TextBox 12"/>
+          <p:cNvSpPr txBox="1"/>
+          <p:nvPr/>
+        </p:nvSpPr>
+        <p:spPr>
+          <a:xfrm>
+            <a:off x="481937" y="4074874"/>
+            <a:ext cx="232239" cy="307777"/>
+          </a:xfrm>
+          <a:prstGeom prst="rect">
+            <a:avLst/>
+          </a:prstGeom>
+          <a:noFill/>
+        </p:spPr>
+        <p:txBody>
+          <a:bodyPr wrap="square" rtlCol="0">
+            <a:spAutoFit/>
+          </a:bodyPr>
+          <a:lstStyle/>
+          <a:p>
+            <a:r>
+              <a:rPr lang="en-US" sz="1400" dirty="0" smtClean="0"/>
+              <a:t>3</a:t>
+            </a:r>
+            <a:endParaRPr lang="en-US" sz="1400" dirty="0"/>
+          </a:p>
+        </p:txBody>
+      </p:sp>
+      <p:sp>
+        <p:nvSpPr>
+          <p:cNvPr id="14" name="TextBox 13"/>
+          <p:cNvSpPr txBox="1"/>
+          <p:nvPr/>
+        </p:nvSpPr>
+        <p:spPr>
+          <a:xfrm>
+            <a:off x="481937" y="4295342"/>
+            <a:ext cx="232239" cy="307777"/>
+          </a:xfrm>
+          <a:prstGeom prst="rect">
+            <a:avLst/>
+          </a:prstGeom>
+          <a:noFill/>
+        </p:spPr>
+        <p:txBody>
+          <a:bodyPr wrap="square" rtlCol="0">
+            <a:spAutoFit/>
+          </a:bodyPr>
+          <a:lstStyle/>
+          <a:p>
+            <a:r>
+              <a:rPr lang="en-US" sz="1400" dirty="0" smtClean="0"/>
+              <a:t>4</a:t>
+            </a:r>
+            <a:endParaRPr lang="en-US" sz="1400" dirty="0"/>
+          </a:p>
+        </p:txBody>
+      </p:sp>
+      <p:sp>
+        <p:nvSpPr>
+          <p:cNvPr id="15" name="TextBox 14"/>
+          <p:cNvSpPr txBox="1"/>
+          <p:nvPr/>
+        </p:nvSpPr>
+        <p:spPr>
+          <a:xfrm>
+            <a:off x="481936" y="4484617"/>
+            <a:ext cx="232239" cy="307777"/>
+          </a:xfrm>
+          <a:prstGeom prst="rect">
+            <a:avLst/>
+          </a:prstGeom>
+          <a:noFill/>
+        </p:spPr>
+        <p:txBody>
+          <a:bodyPr wrap="square" rtlCol="0">
+            <a:spAutoFit/>
+          </a:bodyPr>
+          <a:lstStyle/>
+          <a:p>
+            <a:r>
+              <a:rPr lang="en-US" sz="1400" dirty="0"/>
+              <a:t>5</a:t>
+            </a:r>
+            <a:endParaRPr lang="en-US" sz="1400" dirty="0"/>
+          </a:p>
+        </p:txBody>
+      </p:sp>
+      <p:sp>
+        <p:nvSpPr>
+          <p:cNvPr id="16" name="TextBox 15"/>
+          <p:cNvSpPr txBox="1"/>
+          <p:nvPr/>
+        </p:nvSpPr>
+        <p:spPr>
+          <a:xfrm>
+            <a:off x="477317" y="4689523"/>
+            <a:ext cx="232239" cy="307777"/>
+          </a:xfrm>
+          <a:prstGeom prst="rect">
+            <a:avLst/>
+          </a:prstGeom>
+          <a:noFill/>
+        </p:spPr>
+        <p:txBody>
+          <a:bodyPr wrap="square" rtlCol="0">
+            <a:spAutoFit/>
+          </a:bodyPr>
+          <a:lstStyle/>
+          <a:p>
+            <a:r>
+              <a:rPr lang="en-US" sz="1400" dirty="0" smtClean="0"/>
+              <a:t>6</a:t>
+            </a:r>
+            <a:endParaRPr lang="en-US" sz="1400" dirty="0"/>
+          </a:p>
+        </p:txBody>
+      </p:sp>
+      <p:sp>
+        <p:nvSpPr>
+          <p:cNvPr id="17" name="TextBox 16"/>
+          <p:cNvSpPr txBox="1"/>
+          <p:nvPr/>
+        </p:nvSpPr>
+        <p:spPr>
+          <a:xfrm>
+            <a:off x="488271" y="5130459"/>
+            <a:ext cx="6566221" cy="584775"/>
+          </a:xfrm>
+          <a:prstGeom prst="rect">
+            <a:avLst/>
+          </a:prstGeom>
+          <a:noFill/>
+        </p:spPr>
+        <p:txBody>
+          <a:bodyPr wrap="none" rtlCol="0">
+            <a:spAutoFit/>
+          </a:bodyPr>
+          <a:lstStyle/>
+          <a:p>
+            <a:r>
+              <a:rPr lang="ru-RU" sz="1600" dirty="0" smtClean="0"/>
+              <a:t>Подробнее об операторе </a:t>
+            </a:r>
+            <a:r>
+              <a:rPr lang="en-US" sz="1600" dirty="0" smtClean="0"/>
+              <a:t>delete:</a:t>
+            </a:r>
+            <a:br>
+              <a:rPr lang="en-US" sz="1600" dirty="0" smtClean="0"/>
+            </a:br>
+            <a:r>
+              <a:rPr lang="en-US" sz="1600" dirty="0" smtClean="0"/>
+              <a:t>https</a:t>
+            </a:r>
+            <a:r>
+              <a:rPr lang="en-US" sz="1600" dirty="0"/>
+              <a:t>://en.cppreference.com/w/cpp/memory/new/operator_delete</a:t>
+            </a:r>
+          </a:p>
+        </p:txBody>
+      </p:sp>
+      <p:sp>
+        <p:nvSpPr>
+          <p:cNvPr id="18" name="TextBox 17"/>
+          <p:cNvSpPr txBox="1"/>
+          <p:nvPr/>
+        </p:nvSpPr>
+        <p:spPr>
+          <a:xfrm>
+            <a:off x="488271" y="2353690"/>
+            <a:ext cx="6349815" cy="584775"/>
+          </a:xfrm>
+          <a:prstGeom prst="rect">
+            <a:avLst/>
+          </a:prstGeom>
+          <a:noFill/>
+        </p:spPr>
+        <p:txBody>
+          <a:bodyPr wrap="none" rtlCol="0">
+            <a:spAutoFit/>
+          </a:bodyPr>
+          <a:lstStyle/>
+          <a:p>
+            <a:r>
+              <a:rPr lang="ru-RU" sz="1600" dirty="0" smtClean="0"/>
+              <a:t>Подробнее об операторе </a:t>
+            </a:r>
+            <a:r>
+              <a:rPr lang="en-US" sz="1600" dirty="0" smtClean="0"/>
+              <a:t>new</a:t>
+            </a:r>
+          </a:p>
+          <a:p>
+            <a:r>
+              <a:rPr lang="en-US" sz="1600" dirty="0" smtClean="0"/>
+              <a:t>https</a:t>
+            </a:r>
+            <a:r>
+              <a:rPr lang="en-US" sz="1600" dirty="0"/>
+              <a:t>://en.cppreference.com/w/cpp/memory/new/operator_new</a:t>
+            </a:r>
+          </a:p>
+        </p:txBody>
+      </p:sp>
+      <p:sp>
+        <p:nvSpPr>
+          <p:cNvPr id="19" name="Объект 2"/>
+          <p:cNvSpPr txBox="1">
+            <a:spLocks/>
+          </p:cNvSpPr>
+          <p:nvPr/>
+        </p:nvSpPr>
+        <p:spPr>
+          <a:xfrm>
+            <a:off x="7178041" y="3545339"/>
+            <a:ext cx="4611504" cy="2319971"/>
+          </a:xfrm>
+          <a:prstGeom prst="rect">
+            <a:avLst/>
+          </a:prstGeom>
+          <a:solidFill>
+            <a:schemeClr val="bg1"/>
+          </a:solidFill>
+        </p:spPr>
+        <p:txBody>
+          <a:bodyPr vert="horz" lIns="91440" tIns="45720" rIns="91440" bIns="45720" rtlCol="0">
+            <a:normAutofit/>
+          </a:bodyPr>
+          <a:lstStyle>
+            <a:lvl1pPr marL="342900" indent="-342900" algn="l" defTabSz="457200" rtl="0" eaLnBrk="1" latinLnBrk="0" hangingPunct="1">
+              <a:spcBef>
+                <a:spcPts val="1000"/>
+              </a:spcBef>
+              <a:spcAft>
+                <a:spcPts val="0"/>
+              </a:spcAft>
+              <a:buClr>
+                <a:schemeClr val="accent1"/>
+              </a:buClr>
+              <a:buSzPct val="80000"/>
+              <a:buFont typeface="Wingdings 3" charset="2"/>
+              <a:buChar char=""/>
+              <a:defRPr sz="1800" kern="1200">
+                <a:solidFill>
+                  <a:schemeClr val="tx1">
+                    <a:lumMod val="75000"/>
+                    <a:lumOff val="25000"/>
+                  </a:schemeClr>
+                </a:solidFill>
+                <a:latin typeface="+mn-lt"/>
+                <a:ea typeface="+mn-ea"/>
+                <a:cs typeface="+mn-cs"/>
+              </a:defRPr>
+            </a:lvl1pPr>
+            <a:lvl2pPr marL="742950" indent="-285750" algn="l" defTabSz="457200" rtl="0" eaLnBrk="1" latinLnBrk="0" hangingPunct="1">
+              <a:spcBef>
+                <a:spcPts val="1000"/>
+              </a:spcBef>
+              <a:spcAft>
+                <a:spcPts val="0"/>
+              </a:spcAft>
+              <a:buClr>
+                <a:schemeClr val="accent1"/>
+              </a:buClr>
+              <a:buSzPct val="80000"/>
+              <a:buFont typeface="Wingdings 3" charset="2"/>
+              <a:buChar char=""/>
+              <a:defRPr sz="1600" kern="1200">
+                <a:solidFill>
+                  <a:schemeClr val="tx1">
+                    <a:lumMod val="75000"/>
+                    <a:lumOff val="25000"/>
+                  </a:schemeClr>
+                </a:solidFill>
+                <a:latin typeface="+mn-lt"/>
+                <a:ea typeface="+mn-ea"/>
+                <a:cs typeface="+mn-cs"/>
+              </a:defRPr>
+            </a:lvl2pPr>
+            <a:lvl3pPr marL="1143000" indent="-228600" algn="l" defTabSz="457200" rtl="0" eaLnBrk="1" latinLnBrk="0" hangingPunct="1">
+              <a:spcBef>
+                <a:spcPts val="1000"/>
+              </a:spcBef>
+              <a:spcAft>
+                <a:spcPts val="0"/>
+              </a:spcAft>
+              <a:buClr>
+                <a:schemeClr val="accent1"/>
+              </a:buClr>
+              <a:buSzPct val="80000"/>
+              <a:buFont typeface="Wingdings 3" charset="2"/>
+              <a:buChar char=""/>
+              <a:defRPr sz="1400" kern="1200">
+                <a:solidFill>
+                  <a:schemeClr val="tx1">
+                    <a:lumMod val="75000"/>
+                    <a:lumOff val="25000"/>
+                  </a:schemeClr>
+                </a:solidFill>
+                <a:latin typeface="+mn-lt"/>
+                <a:ea typeface="+mn-ea"/>
+                <a:cs typeface="+mn-cs"/>
+              </a:defRPr>
+            </a:lvl3pPr>
+            <a:lvl4pPr marL="1600200" indent="-228600" algn="l" defTabSz="457200" rtl="0" eaLnBrk="1" latinLnBrk="0" hangingPunct="1">
+              <a:spcBef>
+                <a:spcPts val="1000"/>
+              </a:spcBef>
+              <a:spcAft>
+                <a:spcPts val="0"/>
+              </a:spcAft>
+              <a:buClr>
+                <a:schemeClr val="accent1"/>
+              </a:buClr>
+              <a:buSzPct val="80000"/>
+              <a:buFont typeface="Wingdings 3" charset="2"/>
+              <a:buChar char=""/>
+              <a:defRPr sz="1200" kern="1200">
+                <a:solidFill>
+                  <a:schemeClr val="tx1">
+                    <a:lumMod val="75000"/>
+                    <a:lumOff val="25000"/>
+                  </a:schemeClr>
+                </a:solidFill>
+                <a:latin typeface="+mn-lt"/>
+                <a:ea typeface="+mn-ea"/>
+                <a:cs typeface="+mn-cs"/>
+              </a:defRPr>
+            </a:lvl4pPr>
+            <a:lvl5pPr marL="2057400" indent="-228600" algn="l" defTabSz="457200" rtl="0" eaLnBrk="1" latinLnBrk="0" hangingPunct="1">
+              <a:spcBef>
+                <a:spcPts val="1000"/>
+              </a:spcBef>
+              <a:spcAft>
+                <a:spcPts val="0"/>
+              </a:spcAft>
+              <a:buClr>
+                <a:schemeClr val="accent1"/>
+              </a:buClr>
+              <a:buSzPct val="80000"/>
+              <a:buFont typeface="Wingdings 3" charset="2"/>
+              <a:buChar char=""/>
+              <a:defRPr sz="1200" kern="1200">
+                <a:solidFill>
+                  <a:schemeClr val="tx1">
+                    <a:lumMod val="75000"/>
+                    <a:lumOff val="25000"/>
+                  </a:schemeClr>
+                </a:solidFill>
+                <a:latin typeface="+mn-lt"/>
+                <a:ea typeface="+mn-ea"/>
+                <a:cs typeface="+mn-cs"/>
+              </a:defRPr>
+            </a:lvl5pPr>
+            <a:lvl6pPr marL="2514600" indent="-228600" algn="l" defTabSz="457200" rtl="0" eaLnBrk="1" latinLnBrk="0" hangingPunct="1">
+              <a:spcBef>
+                <a:spcPts val="1000"/>
+              </a:spcBef>
+              <a:spcAft>
+                <a:spcPts val="0"/>
+              </a:spcAft>
+              <a:buClr>
+                <a:schemeClr val="accent1"/>
+              </a:buClr>
+              <a:buSzPct val="80000"/>
+              <a:buFont typeface="Wingdings 3" charset="2"/>
+              <a:buChar char=""/>
+              <a:defRPr sz="1200" kern="1200">
+                <a:solidFill>
+                  <a:schemeClr val="tx1">
+                    <a:lumMod val="75000"/>
+                    <a:lumOff val="25000"/>
+                  </a:schemeClr>
+                </a:solidFill>
+                <a:latin typeface="+mn-lt"/>
+                <a:ea typeface="+mn-ea"/>
+                <a:cs typeface="+mn-cs"/>
+              </a:defRPr>
+            </a:lvl6pPr>
+            <a:lvl7pPr marL="2971800" indent="-228600" algn="l" defTabSz="457200" rtl="0" eaLnBrk="1" latinLnBrk="0" hangingPunct="1">
+              <a:spcBef>
+                <a:spcPts val="1000"/>
+              </a:spcBef>
+              <a:spcAft>
+                <a:spcPts val="0"/>
+              </a:spcAft>
+              <a:buClr>
+                <a:schemeClr val="accent1"/>
+              </a:buClr>
+              <a:buSzPct val="80000"/>
+              <a:buFont typeface="Wingdings 3" charset="2"/>
+              <a:buChar char=""/>
+              <a:defRPr sz="1200" kern="1200">
+                <a:solidFill>
+                  <a:schemeClr val="tx1">
+                    <a:lumMod val="75000"/>
+                    <a:lumOff val="25000"/>
+                  </a:schemeClr>
+                </a:solidFill>
+                <a:latin typeface="+mn-lt"/>
+                <a:ea typeface="+mn-ea"/>
+                <a:cs typeface="+mn-cs"/>
+              </a:defRPr>
+            </a:lvl7pPr>
+            <a:lvl8pPr marL="3429000" indent="-228600" algn="l" defTabSz="457200" rtl="0" eaLnBrk="1" latinLnBrk="0" hangingPunct="1">
+              <a:spcBef>
+                <a:spcPts val="1000"/>
+              </a:spcBef>
+              <a:spcAft>
+                <a:spcPts val="0"/>
+              </a:spcAft>
+              <a:buClr>
+                <a:schemeClr val="accent1"/>
+              </a:buClr>
+              <a:buSzPct val="80000"/>
+              <a:buFont typeface="Wingdings 3" charset="2"/>
+              <a:buChar char=""/>
+              <a:defRPr sz="1200" kern="1200">
+                <a:solidFill>
+                  <a:schemeClr val="tx1">
+                    <a:lumMod val="75000"/>
+                    <a:lumOff val="25000"/>
+                  </a:schemeClr>
+                </a:solidFill>
+                <a:latin typeface="+mn-lt"/>
+                <a:ea typeface="+mn-ea"/>
+                <a:cs typeface="+mn-cs"/>
+              </a:defRPr>
+            </a:lvl8pPr>
+            <a:lvl9pPr marL="3886200" indent="-228600" algn="l" defTabSz="457200" rtl="0" eaLnBrk="1" latinLnBrk="0" hangingPunct="1">
+              <a:spcBef>
+                <a:spcPts val="1000"/>
+              </a:spcBef>
+              <a:spcAft>
+                <a:spcPts val="0"/>
+              </a:spcAft>
+              <a:buClr>
+                <a:schemeClr val="accent1"/>
+              </a:buClr>
+              <a:buSzPct val="80000"/>
+              <a:buFont typeface="Wingdings 3" charset="2"/>
+              <a:buChar char=""/>
+              <a:defRPr sz="1200" kern="1200">
+                <a:solidFill>
+                  <a:schemeClr val="tx1">
+                    <a:lumMod val="75000"/>
+                    <a:lumOff val="25000"/>
+                  </a:schemeClr>
+                </a:solidFill>
+                <a:latin typeface="+mn-lt"/>
+                <a:ea typeface="+mn-ea"/>
+                <a:cs typeface="+mn-cs"/>
+              </a:defRPr>
+            </a:lvl9pPr>
+          </a:lstStyle>
+          <a:p>
+            <a:r>
+              <a:rPr lang="ru-RU" sz="1600" dirty="0" smtClean="0"/>
+              <a:t>(3) и (4) вызываются версиями </a:t>
+            </a:r>
+            <a:r>
+              <a:rPr lang="ru-RU" sz="1600" dirty="0"/>
+              <a:t>(3) и (4) </a:t>
+            </a:r>
+            <a:r>
+              <a:rPr lang="ru-RU" sz="1600" dirty="0" smtClean="0"/>
+              <a:t>оператора </a:t>
+            </a:r>
+            <a:r>
+              <a:rPr lang="en-US" sz="1600" dirty="0" smtClean="0"/>
+              <a:t>new</a:t>
+            </a:r>
+            <a:r>
+              <a:rPr lang="ru-RU" sz="1600" dirty="0" smtClean="0"/>
+              <a:t>, если конструктор объекта, для которого такой </a:t>
+            </a:r>
+            <a:r>
+              <a:rPr lang="en-US" sz="1600" dirty="0" smtClean="0"/>
+              <a:t>new </a:t>
+            </a:r>
+            <a:r>
+              <a:rPr lang="ru-RU" sz="1600" dirty="0" smtClean="0"/>
+              <a:t>выделял память, сгенерировал исключение</a:t>
+            </a:r>
+            <a:endParaRPr lang="en-US" sz="1600" dirty="0" smtClean="0"/>
+          </a:p>
+          <a:p>
+            <a:r>
+              <a:rPr lang="ru-RU" sz="1600" dirty="0" smtClean="0"/>
+              <a:t>Как правило достаточно перегрузить (1)</a:t>
+            </a:r>
+            <a:endParaRPr lang="ru-RU" sz="1600" dirty="0" smtClean="0"/>
+          </a:p>
+        </p:txBody>
+      </p:sp>
+      <p:sp>
+        <p:nvSpPr>
+          <p:cNvPr id="20" name="Объект 2"/>
+          <p:cNvSpPr txBox="1">
+            <a:spLocks/>
+          </p:cNvSpPr>
+          <p:nvPr/>
+        </p:nvSpPr>
+        <p:spPr>
+          <a:xfrm>
+            <a:off x="477317" y="5854604"/>
+            <a:ext cx="11312228" cy="730936"/>
+          </a:xfrm>
+          <a:prstGeom prst="rect">
+            <a:avLst/>
+          </a:prstGeom>
+          <a:solidFill>
+            <a:schemeClr val="bg1"/>
+          </a:solidFill>
+        </p:spPr>
+        <p:txBody>
+          <a:bodyPr vert="horz" lIns="91440" tIns="45720" rIns="91440" bIns="45720" rtlCol="0">
+            <a:normAutofit/>
+          </a:bodyPr>
+          <a:lstStyle>
+            <a:lvl1pPr marL="342900" indent="-342900" algn="l" defTabSz="457200" rtl="0" eaLnBrk="1" latinLnBrk="0" hangingPunct="1">
+              <a:spcBef>
+                <a:spcPts val="1000"/>
+              </a:spcBef>
+              <a:spcAft>
+                <a:spcPts val="0"/>
+              </a:spcAft>
+              <a:buClr>
+                <a:schemeClr val="accent1"/>
+              </a:buClr>
+              <a:buSzPct val="80000"/>
+              <a:buFont typeface="Wingdings 3" charset="2"/>
+              <a:buChar char=""/>
+              <a:defRPr sz="1800" kern="1200">
+                <a:solidFill>
+                  <a:schemeClr val="tx1">
+                    <a:lumMod val="75000"/>
+                    <a:lumOff val="25000"/>
+                  </a:schemeClr>
+                </a:solidFill>
+                <a:latin typeface="+mn-lt"/>
+                <a:ea typeface="+mn-ea"/>
+                <a:cs typeface="+mn-cs"/>
+              </a:defRPr>
+            </a:lvl1pPr>
+            <a:lvl2pPr marL="742950" indent="-285750" algn="l" defTabSz="457200" rtl="0" eaLnBrk="1" latinLnBrk="0" hangingPunct="1">
+              <a:spcBef>
+                <a:spcPts val="1000"/>
+              </a:spcBef>
+              <a:spcAft>
+                <a:spcPts val="0"/>
+              </a:spcAft>
+              <a:buClr>
+                <a:schemeClr val="accent1"/>
+              </a:buClr>
+              <a:buSzPct val="80000"/>
+              <a:buFont typeface="Wingdings 3" charset="2"/>
+              <a:buChar char=""/>
+              <a:defRPr sz="1600" kern="1200">
+                <a:solidFill>
+                  <a:schemeClr val="tx1">
+                    <a:lumMod val="75000"/>
+                    <a:lumOff val="25000"/>
+                  </a:schemeClr>
+                </a:solidFill>
+                <a:latin typeface="+mn-lt"/>
+                <a:ea typeface="+mn-ea"/>
+                <a:cs typeface="+mn-cs"/>
+              </a:defRPr>
+            </a:lvl2pPr>
+            <a:lvl3pPr marL="1143000" indent="-228600" algn="l" defTabSz="457200" rtl="0" eaLnBrk="1" latinLnBrk="0" hangingPunct="1">
+              <a:spcBef>
+                <a:spcPts val="1000"/>
+              </a:spcBef>
+              <a:spcAft>
+                <a:spcPts val="0"/>
+              </a:spcAft>
+              <a:buClr>
+                <a:schemeClr val="accent1"/>
+              </a:buClr>
+              <a:buSzPct val="80000"/>
+              <a:buFont typeface="Wingdings 3" charset="2"/>
+              <a:buChar char=""/>
+              <a:defRPr sz="1400" kern="1200">
+                <a:solidFill>
+                  <a:schemeClr val="tx1">
+                    <a:lumMod val="75000"/>
+                    <a:lumOff val="25000"/>
+                  </a:schemeClr>
+                </a:solidFill>
+                <a:latin typeface="+mn-lt"/>
+                <a:ea typeface="+mn-ea"/>
+                <a:cs typeface="+mn-cs"/>
+              </a:defRPr>
+            </a:lvl3pPr>
+            <a:lvl4pPr marL="1600200" indent="-228600" algn="l" defTabSz="457200" rtl="0" eaLnBrk="1" latinLnBrk="0" hangingPunct="1">
+              <a:spcBef>
+                <a:spcPts val="1000"/>
+              </a:spcBef>
+              <a:spcAft>
+                <a:spcPts val="0"/>
+              </a:spcAft>
+              <a:buClr>
+                <a:schemeClr val="accent1"/>
+              </a:buClr>
+              <a:buSzPct val="80000"/>
+              <a:buFont typeface="Wingdings 3" charset="2"/>
+              <a:buChar char=""/>
+              <a:defRPr sz="1200" kern="1200">
+                <a:solidFill>
+                  <a:schemeClr val="tx1">
+                    <a:lumMod val="75000"/>
+                    <a:lumOff val="25000"/>
+                  </a:schemeClr>
+                </a:solidFill>
+                <a:latin typeface="+mn-lt"/>
+                <a:ea typeface="+mn-ea"/>
+                <a:cs typeface="+mn-cs"/>
+              </a:defRPr>
+            </a:lvl4pPr>
+            <a:lvl5pPr marL="2057400" indent="-228600" algn="l" defTabSz="457200" rtl="0" eaLnBrk="1" latinLnBrk="0" hangingPunct="1">
+              <a:spcBef>
+                <a:spcPts val="1000"/>
+              </a:spcBef>
+              <a:spcAft>
+                <a:spcPts val="0"/>
+              </a:spcAft>
+              <a:buClr>
+                <a:schemeClr val="accent1"/>
+              </a:buClr>
+              <a:buSzPct val="80000"/>
+              <a:buFont typeface="Wingdings 3" charset="2"/>
+              <a:buChar char=""/>
+              <a:defRPr sz="1200" kern="1200">
+                <a:solidFill>
+                  <a:schemeClr val="tx1">
+                    <a:lumMod val="75000"/>
+                    <a:lumOff val="25000"/>
+                  </a:schemeClr>
+                </a:solidFill>
+                <a:latin typeface="+mn-lt"/>
+                <a:ea typeface="+mn-ea"/>
+                <a:cs typeface="+mn-cs"/>
+              </a:defRPr>
+            </a:lvl5pPr>
+            <a:lvl6pPr marL="2514600" indent="-228600" algn="l" defTabSz="457200" rtl="0" eaLnBrk="1" latinLnBrk="0" hangingPunct="1">
+              <a:spcBef>
+                <a:spcPts val="1000"/>
+              </a:spcBef>
+              <a:spcAft>
+                <a:spcPts val="0"/>
+              </a:spcAft>
+              <a:buClr>
+                <a:schemeClr val="accent1"/>
+              </a:buClr>
+              <a:buSzPct val="80000"/>
+              <a:buFont typeface="Wingdings 3" charset="2"/>
+              <a:buChar char=""/>
+              <a:defRPr sz="1200" kern="1200">
+                <a:solidFill>
+                  <a:schemeClr val="tx1">
+                    <a:lumMod val="75000"/>
+                    <a:lumOff val="25000"/>
+                  </a:schemeClr>
+                </a:solidFill>
+                <a:latin typeface="+mn-lt"/>
+                <a:ea typeface="+mn-ea"/>
+                <a:cs typeface="+mn-cs"/>
+              </a:defRPr>
+            </a:lvl6pPr>
+            <a:lvl7pPr marL="2971800" indent="-228600" algn="l" defTabSz="457200" rtl="0" eaLnBrk="1" latinLnBrk="0" hangingPunct="1">
+              <a:spcBef>
+                <a:spcPts val="1000"/>
+              </a:spcBef>
+              <a:spcAft>
+                <a:spcPts val="0"/>
+              </a:spcAft>
+              <a:buClr>
+                <a:schemeClr val="accent1"/>
+              </a:buClr>
+              <a:buSzPct val="80000"/>
+              <a:buFont typeface="Wingdings 3" charset="2"/>
+              <a:buChar char=""/>
+              <a:defRPr sz="1200" kern="1200">
+                <a:solidFill>
+                  <a:schemeClr val="tx1">
+                    <a:lumMod val="75000"/>
+                    <a:lumOff val="25000"/>
+                  </a:schemeClr>
+                </a:solidFill>
+                <a:latin typeface="+mn-lt"/>
+                <a:ea typeface="+mn-ea"/>
+                <a:cs typeface="+mn-cs"/>
+              </a:defRPr>
+            </a:lvl7pPr>
+            <a:lvl8pPr marL="3429000" indent="-228600" algn="l" defTabSz="457200" rtl="0" eaLnBrk="1" latinLnBrk="0" hangingPunct="1">
+              <a:spcBef>
+                <a:spcPts val="1000"/>
+              </a:spcBef>
+              <a:spcAft>
+                <a:spcPts val="0"/>
+              </a:spcAft>
+              <a:buClr>
+                <a:schemeClr val="accent1"/>
+              </a:buClr>
+              <a:buSzPct val="80000"/>
+              <a:buFont typeface="Wingdings 3" charset="2"/>
+              <a:buChar char=""/>
+              <a:defRPr sz="1200" kern="1200">
+                <a:solidFill>
+                  <a:schemeClr val="tx1">
+                    <a:lumMod val="75000"/>
+                    <a:lumOff val="25000"/>
+                  </a:schemeClr>
+                </a:solidFill>
+                <a:latin typeface="+mn-lt"/>
+                <a:ea typeface="+mn-ea"/>
+                <a:cs typeface="+mn-cs"/>
+              </a:defRPr>
+            </a:lvl8pPr>
+            <a:lvl9pPr marL="3886200" indent="-228600" algn="l" defTabSz="457200" rtl="0" eaLnBrk="1" latinLnBrk="0" hangingPunct="1">
+              <a:spcBef>
+                <a:spcPts val="1000"/>
+              </a:spcBef>
+              <a:spcAft>
+                <a:spcPts val="0"/>
+              </a:spcAft>
+              <a:buClr>
+                <a:schemeClr val="accent1"/>
+              </a:buClr>
+              <a:buSzPct val="80000"/>
+              <a:buFont typeface="Wingdings 3" charset="2"/>
+              <a:buChar char=""/>
+              <a:defRPr sz="1200" kern="1200">
+                <a:solidFill>
+                  <a:schemeClr val="tx1">
+                    <a:lumMod val="75000"/>
+                    <a:lumOff val="25000"/>
+                  </a:schemeClr>
+                </a:solidFill>
+                <a:latin typeface="+mn-lt"/>
+                <a:ea typeface="+mn-ea"/>
+                <a:cs typeface="+mn-cs"/>
+              </a:defRPr>
+            </a:lvl9pPr>
+          </a:lstStyle>
+          <a:p>
+            <a:r>
+              <a:rPr lang="ru-RU" sz="1600" dirty="0" smtClean="0"/>
+              <a:t>Вариант применения: отслеживание утечек памяти</a:t>
+            </a:r>
+            <a:endParaRPr lang="en-US" sz="1600" dirty="0" smtClean="0"/>
+          </a:p>
+        </p:txBody>
+      </p:sp>
+    </p:spTree>
+    <p:extLst>
+      <p:ext uri="{BB962C8B-B14F-4D97-AF65-F5344CB8AC3E}">
+        <p14:creationId xmlns:p14="http://schemas.microsoft.com/office/powerpoint/2010/main" val="4048409101"/>
       </p:ext>
     </p:extLst>
   </p:cSld>
@@ -7313,7 +8474,7 @@
           <p:cNvPr id="2" name="Title 1">
             <a:extLst>
               <a:ext uri="{FF2B5EF4-FFF2-40B4-BE49-F238E27FC236}">
-                <a16:creationId xmlns="" xmlns:a16="http://schemas.microsoft.com/office/drawing/2014/main" id="{ECF0BCE9-3024-43A2-BA59-C2729B585737}"/>
+                <a16:creationId xmlns:a16="http://schemas.microsoft.com/office/drawing/2014/main" xmlns="" id="{ECF0BCE9-3024-43A2-BA59-C2729B585737}"/>
               </a:ext>
             </a:extLst>
           </p:cNvPr>
@@ -7358,7 +8519,7 @@
           <p:cNvPr id="3" name="Content Placeholder 2">
             <a:extLst>
               <a:ext uri="{FF2B5EF4-FFF2-40B4-BE49-F238E27FC236}">
-                <a16:creationId xmlns="" xmlns:a16="http://schemas.microsoft.com/office/drawing/2014/main" id="{F576D460-45FA-449C-991B-87AC9AC2B61A}"/>
+                <a16:creationId xmlns:a16="http://schemas.microsoft.com/office/drawing/2014/main" xmlns="" id="{F576D460-45FA-449C-991B-87AC9AC2B61A}"/>
               </a:ext>
             </a:extLst>
           </p:cNvPr>
@@ -7504,7 +8665,7 @@
           <p:cNvPr id="4" name="Picture 3">
             <a:extLst>
               <a:ext uri="{FF2B5EF4-FFF2-40B4-BE49-F238E27FC236}">
-                <a16:creationId xmlns="" xmlns:a16="http://schemas.microsoft.com/office/drawing/2014/main" id="{46012102-A190-4831-9B76-C87D3E367D14}"/>
+                <a16:creationId xmlns:a16="http://schemas.microsoft.com/office/drawing/2014/main" xmlns="" id="{46012102-A190-4831-9B76-C87D3E367D14}"/>
               </a:ext>
             </a:extLst>
           </p:cNvPr>
@@ -7534,7 +8695,7 @@
           <p:cNvPr id="5" name="Content Placeholder 2">
             <a:extLst>
               <a:ext uri="{FF2B5EF4-FFF2-40B4-BE49-F238E27FC236}">
-                <a16:creationId xmlns="" xmlns:a16="http://schemas.microsoft.com/office/drawing/2014/main" id="{8FD65834-FA22-40B1-963D-BA6904D33A6C}"/>
+                <a16:creationId xmlns:a16="http://schemas.microsoft.com/office/drawing/2014/main" xmlns="" id="{8FD65834-FA22-40B1-963D-BA6904D33A6C}"/>
               </a:ext>
             </a:extLst>
           </p:cNvPr>
@@ -7824,7 +8985,7 @@
           <p:cNvPr id="6" name="Content Placeholder 2">
             <a:extLst>
               <a:ext uri="{FF2B5EF4-FFF2-40B4-BE49-F238E27FC236}">
-                <a16:creationId xmlns="" xmlns:a16="http://schemas.microsoft.com/office/drawing/2014/main" id="{8FD65834-FA22-40B1-963D-BA6904D33A6C}"/>
+                <a16:creationId xmlns:a16="http://schemas.microsoft.com/office/drawing/2014/main" xmlns="" id="{8FD65834-FA22-40B1-963D-BA6904D33A6C}"/>
               </a:ext>
             </a:extLst>
           </p:cNvPr>
@@ -8136,7 +9297,7 @@
           <p:cNvPr id="4" name="Title 1">
             <a:extLst>
               <a:ext uri="{FF2B5EF4-FFF2-40B4-BE49-F238E27FC236}">
-                <a16:creationId xmlns="" xmlns:a16="http://schemas.microsoft.com/office/drawing/2014/main" id="{C9F3A54F-2754-468D-BEEC-B4EED9A8CD41}"/>
+                <a16:creationId xmlns:a16="http://schemas.microsoft.com/office/drawing/2014/main" xmlns="" id="{C9F3A54F-2754-468D-BEEC-B4EED9A8CD41}"/>
               </a:ext>
             </a:extLst>
           </p:cNvPr>
@@ -8181,7 +9342,7 @@
           <p:cNvPr id="5" name="Picture 4">
             <a:extLst>
               <a:ext uri="{FF2B5EF4-FFF2-40B4-BE49-F238E27FC236}">
-                <a16:creationId xmlns="" xmlns:a16="http://schemas.microsoft.com/office/drawing/2014/main" id="{C5ABF65F-74F9-473E-8488-096D95CEC7F8}"/>
+                <a16:creationId xmlns:a16="http://schemas.microsoft.com/office/drawing/2014/main" xmlns="" id="{C5ABF65F-74F9-473E-8488-096D95CEC7F8}"/>
               </a:ext>
             </a:extLst>
           </p:cNvPr>
@@ -8210,7 +9371,7 @@
           <p:cNvPr id="8" name="Picture 7">
             <a:extLst>
               <a:ext uri="{FF2B5EF4-FFF2-40B4-BE49-F238E27FC236}">
-                <a16:creationId xmlns="" xmlns:a16="http://schemas.microsoft.com/office/drawing/2014/main" id="{F91BB84C-61BA-44AC-A5EF-E124C327FF24}"/>
+                <a16:creationId xmlns:a16="http://schemas.microsoft.com/office/drawing/2014/main" xmlns="" id="{F91BB84C-61BA-44AC-A5EF-E124C327FF24}"/>
               </a:ext>
             </a:extLst>
           </p:cNvPr>
@@ -8240,7 +9401,7 @@
           <p:cNvPr id="6" name="Content Placeholder 2">
             <a:extLst>
               <a:ext uri="{FF2B5EF4-FFF2-40B4-BE49-F238E27FC236}">
-                <a16:creationId xmlns="" xmlns:a16="http://schemas.microsoft.com/office/drawing/2014/main" id="{F576D460-45FA-449C-991B-87AC9AC2B61A}"/>
+                <a16:creationId xmlns:a16="http://schemas.microsoft.com/office/drawing/2014/main" xmlns="" id="{F576D460-45FA-449C-991B-87AC9AC2B61A}"/>
               </a:ext>
             </a:extLst>
           </p:cNvPr>
@@ -8576,7 +9737,7 @@
           <p:cNvPr id="15" name="Content Placeholder 2">
             <a:extLst>
               <a:ext uri="{FF2B5EF4-FFF2-40B4-BE49-F238E27FC236}">
-                <a16:creationId xmlns="" xmlns:a16="http://schemas.microsoft.com/office/drawing/2014/main" id="{F576D460-45FA-449C-991B-87AC9AC2B61A}"/>
+                <a16:creationId xmlns:a16="http://schemas.microsoft.com/office/drawing/2014/main" xmlns="" id="{F576D460-45FA-449C-991B-87AC9AC2B61A}"/>
               </a:ext>
             </a:extLst>
           </p:cNvPr>
@@ -9477,7 +10638,7 @@
           <p:cNvPr id="4" name="Title 1">
             <a:extLst>
               <a:ext uri="{FF2B5EF4-FFF2-40B4-BE49-F238E27FC236}">
-                <a16:creationId xmlns="" xmlns:a16="http://schemas.microsoft.com/office/drawing/2014/main" id="{C9F3A54F-2754-468D-BEEC-B4EED9A8CD41}"/>
+                <a16:creationId xmlns:a16="http://schemas.microsoft.com/office/drawing/2014/main" xmlns="" id="{C9F3A54F-2754-468D-BEEC-B4EED9A8CD41}"/>
               </a:ext>
             </a:extLst>
           </p:cNvPr>
@@ -9803,7 +10964,7 @@
           <p:cNvPr id="4" name="Title 1">
             <a:extLst>
               <a:ext uri="{FF2B5EF4-FFF2-40B4-BE49-F238E27FC236}">
-                <a16:creationId xmlns="" xmlns:a16="http://schemas.microsoft.com/office/drawing/2014/main" id="{C9F3A54F-2754-468D-BEEC-B4EED9A8CD41}"/>
+                <a16:creationId xmlns:a16="http://schemas.microsoft.com/office/drawing/2014/main" xmlns="" id="{C9F3A54F-2754-468D-BEEC-B4EED9A8CD41}"/>
               </a:ext>
             </a:extLst>
           </p:cNvPr>
@@ -9848,7 +11009,7 @@
           <p:cNvPr id="6" name="Rectangle 23">
             <a:extLst>
               <a:ext uri="{FF2B5EF4-FFF2-40B4-BE49-F238E27FC236}">
-                <a16:creationId xmlns="" xmlns:a16="http://schemas.microsoft.com/office/drawing/2014/main" id="{FA840233-44DF-4832-88E1-F39BB73FC079}"/>
+                <a16:creationId xmlns:a16="http://schemas.microsoft.com/office/drawing/2014/main" xmlns="" id="{FA840233-44DF-4832-88E1-F39BB73FC079}"/>
               </a:ext>
             </a:extLst>
           </p:cNvPr>
@@ -9896,7 +11057,7 @@
           <p:cNvPr id="10" name="Rectangle 23">
             <a:extLst>
               <a:ext uri="{FF2B5EF4-FFF2-40B4-BE49-F238E27FC236}">
-                <a16:creationId xmlns="" xmlns:a16="http://schemas.microsoft.com/office/drawing/2014/main" id="{FA840233-44DF-4832-88E1-F39BB73FC079}"/>
+                <a16:creationId xmlns:a16="http://schemas.microsoft.com/office/drawing/2014/main" xmlns="" id="{FA840233-44DF-4832-88E1-F39BB73FC079}"/>
               </a:ext>
             </a:extLst>
           </p:cNvPr>
@@ -10422,11 +11583,7 @@
           <a:p>
             <a:r>
               <a:rPr lang="ru-RU" dirty="0" smtClean="0"/>
-              <a:t>Легко </a:t>
-            </a:r>
-            <a:r>
-              <a:rPr lang="ru-RU" dirty="0" smtClean="0"/>
-              <a:t>ошибиться, включая </a:t>
+              <a:t>Легко ошибиться, включая </a:t>
             </a:r>
             <a:r>
               <a:rPr lang="en-US" dirty="0" err="1" smtClean="0"/>
@@ -11202,7 +12359,7 @@
           <p:cNvPr id="2" name="Title 1">
             <a:extLst>
               <a:ext uri="{FF2B5EF4-FFF2-40B4-BE49-F238E27FC236}">
-                <a16:creationId xmlns="" xmlns:a16="http://schemas.microsoft.com/office/drawing/2014/main" id="{126FC2D9-5672-426F-836C-3AFA32952B2F}"/>
+                <a16:creationId xmlns:a16="http://schemas.microsoft.com/office/drawing/2014/main" xmlns="" id="{126FC2D9-5672-426F-836C-3AFA32952B2F}"/>
               </a:ext>
             </a:extLst>
           </p:cNvPr>
@@ -11249,7 +12406,7 @@
           <p:cNvPr id="3" name="Content Placeholder 2">
             <a:extLst>
               <a:ext uri="{FF2B5EF4-FFF2-40B4-BE49-F238E27FC236}">
-                <a16:creationId xmlns="" xmlns:a16="http://schemas.microsoft.com/office/drawing/2014/main" id="{0D4DA9F0-4FA9-43B7-8013-B87855EC7A43}"/>
+                <a16:creationId xmlns:a16="http://schemas.microsoft.com/office/drawing/2014/main" xmlns="" id="{0D4DA9F0-4FA9-43B7-8013-B87855EC7A43}"/>
               </a:ext>
             </a:extLst>
           </p:cNvPr>
@@ -11292,7 +12449,7 @@
           <p:cNvPr id="6" name="Rectangle 5">
             <a:extLst>
               <a:ext uri="{FF2B5EF4-FFF2-40B4-BE49-F238E27FC236}">
-                <a16:creationId xmlns="" xmlns:a16="http://schemas.microsoft.com/office/drawing/2014/main" id="{09AC0FDB-6B8E-4760-A793-6755CFE857D6}"/>
+                <a16:creationId xmlns:a16="http://schemas.microsoft.com/office/drawing/2014/main" xmlns="" id="{09AC0FDB-6B8E-4760-A793-6755CFE857D6}"/>
               </a:ext>
             </a:extLst>
           </p:cNvPr>
@@ -11339,7 +12496,7 @@
           <p:cNvPr id="19" name="Rectangle 18">
             <a:extLst>
               <a:ext uri="{FF2B5EF4-FFF2-40B4-BE49-F238E27FC236}">
-                <a16:creationId xmlns="" xmlns:a16="http://schemas.microsoft.com/office/drawing/2014/main" id="{4C371291-F771-436E-803C-16B9DC440443}"/>
+                <a16:creationId xmlns:a16="http://schemas.microsoft.com/office/drawing/2014/main" xmlns="" id="{4C371291-F771-436E-803C-16B9DC440443}"/>
               </a:ext>
             </a:extLst>
           </p:cNvPr>
@@ -11386,7 +12543,7 @@
           <p:cNvPr id="24" name="Rectangle 23">
             <a:extLst>
               <a:ext uri="{FF2B5EF4-FFF2-40B4-BE49-F238E27FC236}">
-                <a16:creationId xmlns="" xmlns:a16="http://schemas.microsoft.com/office/drawing/2014/main" id="{FA840233-44DF-4832-88E1-F39BB73FC079}"/>
+                <a16:creationId xmlns:a16="http://schemas.microsoft.com/office/drawing/2014/main" xmlns="" id="{FA840233-44DF-4832-88E1-F39BB73FC079}"/>
               </a:ext>
             </a:extLst>
           </p:cNvPr>
@@ -11433,7 +12590,7 @@
           <p:cNvPr id="25" name="Rectangle 24">
             <a:extLst>
               <a:ext uri="{FF2B5EF4-FFF2-40B4-BE49-F238E27FC236}">
-                <a16:creationId xmlns="" xmlns:a16="http://schemas.microsoft.com/office/drawing/2014/main" id="{A3A09A90-3378-48AB-BA69-1F54A6209EC1}"/>
+                <a16:creationId xmlns:a16="http://schemas.microsoft.com/office/drawing/2014/main" xmlns="" id="{A3A09A90-3378-48AB-BA69-1F54A6209EC1}"/>
               </a:ext>
             </a:extLst>
           </p:cNvPr>
@@ -11480,7 +12637,7 @@
           <p:cNvPr id="26" name="Rectangle 25">
             <a:extLst>
               <a:ext uri="{FF2B5EF4-FFF2-40B4-BE49-F238E27FC236}">
-                <a16:creationId xmlns="" xmlns:a16="http://schemas.microsoft.com/office/drawing/2014/main" id="{C807E56F-0C6D-42FC-9152-CAFA8D7FBED8}"/>
+                <a16:creationId xmlns:a16="http://schemas.microsoft.com/office/drawing/2014/main" xmlns="" id="{C807E56F-0C6D-42FC-9152-CAFA8D7FBED8}"/>
               </a:ext>
             </a:extLst>
           </p:cNvPr>
@@ -11528,7 +12685,7 @@
           <p:cNvPr id="27" name="Rectangle 26">
             <a:extLst>
               <a:ext uri="{FF2B5EF4-FFF2-40B4-BE49-F238E27FC236}">
-                <a16:creationId xmlns="" xmlns:a16="http://schemas.microsoft.com/office/drawing/2014/main" id="{C00039DD-8DE7-4FFD-A09A-E7C1048CF354}"/>
+                <a16:creationId xmlns:a16="http://schemas.microsoft.com/office/drawing/2014/main" xmlns="" id="{C00039DD-8DE7-4FFD-A09A-E7C1048CF354}"/>
               </a:ext>
             </a:extLst>
           </p:cNvPr>
@@ -11576,7 +12733,7 @@
           <p:cNvPr id="28" name="Rectangle 27">
             <a:extLst>
               <a:ext uri="{FF2B5EF4-FFF2-40B4-BE49-F238E27FC236}">
-                <a16:creationId xmlns="" xmlns:a16="http://schemas.microsoft.com/office/drawing/2014/main" id="{BA02A407-7535-4B49-8D4A-E3E67BF018BB}"/>
+                <a16:creationId xmlns:a16="http://schemas.microsoft.com/office/drawing/2014/main" xmlns="" id="{BA02A407-7535-4B49-8D4A-E3E67BF018BB}"/>
               </a:ext>
             </a:extLst>
           </p:cNvPr>
@@ -11624,7 +12781,7 @@
           <p:cNvPr id="29" name="Rectangle 28">
             <a:extLst>
               <a:ext uri="{FF2B5EF4-FFF2-40B4-BE49-F238E27FC236}">
-                <a16:creationId xmlns="" xmlns:a16="http://schemas.microsoft.com/office/drawing/2014/main" id="{1AEDB6D2-E77E-48BD-9633-47721CC4393C}"/>
+                <a16:creationId xmlns:a16="http://schemas.microsoft.com/office/drawing/2014/main" xmlns="" id="{1AEDB6D2-E77E-48BD-9633-47721CC4393C}"/>
               </a:ext>
             </a:extLst>
           </p:cNvPr>
@@ -11672,7 +12829,7 @@
           <p:cNvPr id="30" name="Rectangle 29">
             <a:extLst>
               <a:ext uri="{FF2B5EF4-FFF2-40B4-BE49-F238E27FC236}">
-                <a16:creationId xmlns="" xmlns:a16="http://schemas.microsoft.com/office/drawing/2014/main" id="{32B3F73F-A2AD-4CCD-922E-5322156F7B34}"/>
+                <a16:creationId xmlns:a16="http://schemas.microsoft.com/office/drawing/2014/main" xmlns="" id="{32B3F73F-A2AD-4CCD-922E-5322156F7B34}"/>
               </a:ext>
             </a:extLst>
           </p:cNvPr>
@@ -11720,7 +12877,7 @@
           <p:cNvPr id="31" name="Rectangle 30">
             <a:extLst>
               <a:ext uri="{FF2B5EF4-FFF2-40B4-BE49-F238E27FC236}">
-                <a16:creationId xmlns="" xmlns:a16="http://schemas.microsoft.com/office/drawing/2014/main" id="{0340F170-2359-4D61-8693-4D197FD3E645}"/>
+                <a16:creationId xmlns:a16="http://schemas.microsoft.com/office/drawing/2014/main" xmlns="" id="{0340F170-2359-4D61-8693-4D197FD3E645}"/>
               </a:ext>
             </a:extLst>
           </p:cNvPr>
@@ -11768,7 +12925,7 @@
           <p:cNvPr id="33" name="Straight Arrow Connector 32">
             <a:extLst>
               <a:ext uri="{FF2B5EF4-FFF2-40B4-BE49-F238E27FC236}">
-                <a16:creationId xmlns="" xmlns:a16="http://schemas.microsoft.com/office/drawing/2014/main" id="{7CDB48A8-4E74-476D-A48D-96B0B12E3FA9}"/>
+                <a16:creationId xmlns:a16="http://schemas.microsoft.com/office/drawing/2014/main" xmlns="" id="{7CDB48A8-4E74-476D-A48D-96B0B12E3FA9}"/>
               </a:ext>
             </a:extLst>
           </p:cNvPr>
@@ -11813,7 +12970,7 @@
           <p:cNvPr id="35" name="Straight Arrow Connector 34">
             <a:extLst>
               <a:ext uri="{FF2B5EF4-FFF2-40B4-BE49-F238E27FC236}">
-                <a16:creationId xmlns="" xmlns:a16="http://schemas.microsoft.com/office/drawing/2014/main" id="{C355455F-D2C8-4E23-A828-5458D2DBD01F}"/>
+                <a16:creationId xmlns:a16="http://schemas.microsoft.com/office/drawing/2014/main" xmlns="" id="{C355455F-D2C8-4E23-A828-5458D2DBD01F}"/>
               </a:ext>
             </a:extLst>
           </p:cNvPr>
@@ -11855,7 +13012,7 @@
           <p:cNvPr id="36" name="Straight Arrow Connector 35">
             <a:extLst>
               <a:ext uri="{FF2B5EF4-FFF2-40B4-BE49-F238E27FC236}">
-                <a16:creationId xmlns="" xmlns:a16="http://schemas.microsoft.com/office/drawing/2014/main" id="{20927410-A04E-4CC7-B094-B3EA09727A8D}"/>
+                <a16:creationId xmlns:a16="http://schemas.microsoft.com/office/drawing/2014/main" xmlns="" id="{20927410-A04E-4CC7-B094-B3EA09727A8D}"/>
               </a:ext>
             </a:extLst>
           </p:cNvPr>
@@ -11897,7 +13054,7 @@
           <p:cNvPr id="37" name="Rectangle 36">
             <a:extLst>
               <a:ext uri="{FF2B5EF4-FFF2-40B4-BE49-F238E27FC236}">
-                <a16:creationId xmlns="" xmlns:a16="http://schemas.microsoft.com/office/drawing/2014/main" id="{87421B7C-8A39-413D-9E41-2B0111D3C895}"/>
+                <a16:creationId xmlns:a16="http://schemas.microsoft.com/office/drawing/2014/main" xmlns="" id="{87421B7C-8A39-413D-9E41-2B0111D3C895}"/>
               </a:ext>
             </a:extLst>
           </p:cNvPr>
@@ -11943,7 +13100,7 @@
           <p:cNvPr id="38" name="Straight Arrow Connector 37">
             <a:extLst>
               <a:ext uri="{FF2B5EF4-FFF2-40B4-BE49-F238E27FC236}">
-                <a16:creationId xmlns="" xmlns:a16="http://schemas.microsoft.com/office/drawing/2014/main" id="{249CEE3E-F71E-4C3D-A996-903B4F02FDC8}"/>
+                <a16:creationId xmlns:a16="http://schemas.microsoft.com/office/drawing/2014/main" xmlns="" id="{249CEE3E-F71E-4C3D-A996-903B4F02FDC8}"/>
               </a:ext>
             </a:extLst>
           </p:cNvPr>
@@ -11985,7 +13142,7 @@
           <p:cNvPr id="39" name="Straight Arrow Connector 38">
             <a:extLst>
               <a:ext uri="{FF2B5EF4-FFF2-40B4-BE49-F238E27FC236}">
-                <a16:creationId xmlns="" xmlns:a16="http://schemas.microsoft.com/office/drawing/2014/main" id="{7A889618-B6C1-4FBD-86EE-96FA3F8B5DDC}"/>
+                <a16:creationId xmlns:a16="http://schemas.microsoft.com/office/drawing/2014/main" xmlns="" id="{7A889618-B6C1-4FBD-86EE-96FA3F8B5DDC}"/>
               </a:ext>
             </a:extLst>
           </p:cNvPr>
@@ -12027,7 +13184,7 @@
           <p:cNvPr id="40" name="Straight Arrow Connector 39">
             <a:extLst>
               <a:ext uri="{FF2B5EF4-FFF2-40B4-BE49-F238E27FC236}">
-                <a16:creationId xmlns="" xmlns:a16="http://schemas.microsoft.com/office/drawing/2014/main" id="{D29DFA13-FC62-450F-A9B2-ADFF5594AC79}"/>
+                <a16:creationId xmlns:a16="http://schemas.microsoft.com/office/drawing/2014/main" xmlns="" id="{D29DFA13-FC62-450F-A9B2-ADFF5594AC79}"/>
               </a:ext>
             </a:extLst>
           </p:cNvPr>
@@ -12069,7 +13226,7 @@
           <p:cNvPr id="41" name="Rectangle 40">
             <a:extLst>
               <a:ext uri="{FF2B5EF4-FFF2-40B4-BE49-F238E27FC236}">
-                <a16:creationId xmlns="" xmlns:a16="http://schemas.microsoft.com/office/drawing/2014/main" id="{5C61B8F5-82C6-4867-A505-6FE155336220}"/>
+                <a16:creationId xmlns:a16="http://schemas.microsoft.com/office/drawing/2014/main" xmlns="" id="{5C61B8F5-82C6-4867-A505-6FE155336220}"/>
               </a:ext>
             </a:extLst>
           </p:cNvPr>
@@ -12123,7 +13280,7 @@
           <p:cNvPr id="42" name="TextBox 41">
             <a:extLst>
               <a:ext uri="{FF2B5EF4-FFF2-40B4-BE49-F238E27FC236}">
-                <a16:creationId xmlns="" xmlns:a16="http://schemas.microsoft.com/office/drawing/2014/main" id="{DE840F7A-926A-4F58-BDDF-7CD722D63AFF}"/>
+                <a16:creationId xmlns:a16="http://schemas.microsoft.com/office/drawing/2014/main" xmlns="" id="{DE840F7A-926A-4F58-BDDF-7CD722D63AFF}"/>
               </a:ext>
             </a:extLst>
           </p:cNvPr>
@@ -12159,7 +13316,7 @@
           <p:cNvPr id="43" name="TextBox 42">
             <a:extLst>
               <a:ext uri="{FF2B5EF4-FFF2-40B4-BE49-F238E27FC236}">
-                <a16:creationId xmlns="" xmlns:a16="http://schemas.microsoft.com/office/drawing/2014/main" id="{E5762FCF-458A-4DAC-AE5D-C6DC80E75032}"/>
+                <a16:creationId xmlns:a16="http://schemas.microsoft.com/office/drawing/2014/main" xmlns="" id="{E5762FCF-458A-4DAC-AE5D-C6DC80E75032}"/>
               </a:ext>
             </a:extLst>
           </p:cNvPr>
@@ -12209,7 +13366,7 @@
           <p:cNvPr id="47" name="Straight Connector 46">
             <a:extLst>
               <a:ext uri="{FF2B5EF4-FFF2-40B4-BE49-F238E27FC236}">
-                <a16:creationId xmlns="" xmlns:a16="http://schemas.microsoft.com/office/drawing/2014/main" id="{599C1748-EFE4-4E72-A611-94C27B14FEE9}"/>
+                <a16:creationId xmlns:a16="http://schemas.microsoft.com/office/drawing/2014/main" xmlns="" id="{599C1748-EFE4-4E72-A611-94C27B14FEE9}"/>
               </a:ext>
             </a:extLst>
           </p:cNvPr>
@@ -12245,7 +13402,7 @@
           <p:cNvPr id="49" name="Straight Connector 48">
             <a:extLst>
               <a:ext uri="{FF2B5EF4-FFF2-40B4-BE49-F238E27FC236}">
-                <a16:creationId xmlns="" xmlns:a16="http://schemas.microsoft.com/office/drawing/2014/main" id="{89C45298-8257-411F-8300-D089405EEB37}"/>
+                <a16:creationId xmlns:a16="http://schemas.microsoft.com/office/drawing/2014/main" xmlns="" id="{89C45298-8257-411F-8300-D089405EEB37}"/>
               </a:ext>
             </a:extLst>
           </p:cNvPr>
@@ -12283,7 +13440,7 @@
           <p:cNvPr id="51" name="Straight Connector 50">
             <a:extLst>
               <a:ext uri="{FF2B5EF4-FFF2-40B4-BE49-F238E27FC236}">
-                <a16:creationId xmlns="" xmlns:a16="http://schemas.microsoft.com/office/drawing/2014/main" id="{96383650-D4F5-4029-927B-627CE67DAC9E}"/>
+                <a16:creationId xmlns:a16="http://schemas.microsoft.com/office/drawing/2014/main" xmlns="" id="{96383650-D4F5-4029-927B-627CE67DAC9E}"/>
               </a:ext>
             </a:extLst>
           </p:cNvPr>
@@ -12322,7 +13479,7 @@
           <p:cNvPr id="53" name="Straight Connector 52">
             <a:extLst>
               <a:ext uri="{FF2B5EF4-FFF2-40B4-BE49-F238E27FC236}">
-                <a16:creationId xmlns="" xmlns:a16="http://schemas.microsoft.com/office/drawing/2014/main" id="{A796CED4-27AC-49DD-9322-8C86375E1F4F}"/>
+                <a16:creationId xmlns:a16="http://schemas.microsoft.com/office/drawing/2014/main" xmlns="" id="{A796CED4-27AC-49DD-9322-8C86375E1F4F}"/>
               </a:ext>
             </a:extLst>
           </p:cNvPr>
@@ -12360,7 +13517,7 @@
           <p:cNvPr id="55" name="Straight Arrow Connector 54">
             <a:extLst>
               <a:ext uri="{FF2B5EF4-FFF2-40B4-BE49-F238E27FC236}">
-                <a16:creationId xmlns="" xmlns:a16="http://schemas.microsoft.com/office/drawing/2014/main" id="{163E7EF4-99B5-4A4A-994B-488C9D204CFB}"/>
+                <a16:creationId xmlns:a16="http://schemas.microsoft.com/office/drawing/2014/main" xmlns="" id="{163E7EF4-99B5-4A4A-994B-488C9D204CFB}"/>
               </a:ext>
             </a:extLst>
           </p:cNvPr>
@@ -12402,7 +13559,7 @@
           <p:cNvPr id="58" name="Straight Arrow Connector 57">
             <a:extLst>
               <a:ext uri="{FF2B5EF4-FFF2-40B4-BE49-F238E27FC236}">
-                <a16:creationId xmlns="" xmlns:a16="http://schemas.microsoft.com/office/drawing/2014/main" id="{A12F68F8-AC14-4A2F-8D6C-35467CA94C0D}"/>
+                <a16:creationId xmlns:a16="http://schemas.microsoft.com/office/drawing/2014/main" xmlns="" id="{A12F68F8-AC14-4A2F-8D6C-35467CA94C0D}"/>
               </a:ext>
             </a:extLst>
           </p:cNvPr>
@@ -12443,7 +13600,7 @@
           <p:cNvPr id="59" name="TextBox 58">
             <a:extLst>
               <a:ext uri="{FF2B5EF4-FFF2-40B4-BE49-F238E27FC236}">
-                <a16:creationId xmlns="" xmlns:a16="http://schemas.microsoft.com/office/drawing/2014/main" id="{2BD6648A-EA02-480A-972C-A5CAFD7595D3}"/>
+                <a16:creationId xmlns:a16="http://schemas.microsoft.com/office/drawing/2014/main" xmlns="" id="{2BD6648A-EA02-480A-972C-A5CAFD7595D3}"/>
               </a:ext>
             </a:extLst>
           </p:cNvPr>
@@ -12484,7 +13641,7 @@
           <p:cNvPr id="61" name="TextBox 60">
             <a:extLst>
               <a:ext uri="{FF2B5EF4-FFF2-40B4-BE49-F238E27FC236}">
-                <a16:creationId xmlns="" xmlns:a16="http://schemas.microsoft.com/office/drawing/2014/main" id="{0670A928-DECC-44BC-88D5-0C383EAB305A}"/>
+                <a16:creationId xmlns:a16="http://schemas.microsoft.com/office/drawing/2014/main" xmlns="" id="{0670A928-DECC-44BC-88D5-0C383EAB305A}"/>
               </a:ext>
             </a:extLst>
           </p:cNvPr>
@@ -12551,7 +13708,7 @@
           <p:cNvPr id="62" name="TextBox 61">
             <a:extLst>
               <a:ext uri="{FF2B5EF4-FFF2-40B4-BE49-F238E27FC236}">
-                <a16:creationId xmlns="" xmlns:a16="http://schemas.microsoft.com/office/drawing/2014/main" id="{7F150C4C-7DC3-4C70-911B-F0CF81FB04EC}"/>
+                <a16:creationId xmlns:a16="http://schemas.microsoft.com/office/drawing/2014/main" xmlns="" id="{7F150C4C-7DC3-4C70-911B-F0CF81FB04EC}"/>
               </a:ext>
             </a:extLst>
           </p:cNvPr>
@@ -12595,7 +13752,7 @@
           <p:cNvPr id="63" name="TextBox 62">
             <a:extLst>
               <a:ext uri="{FF2B5EF4-FFF2-40B4-BE49-F238E27FC236}">
-                <a16:creationId xmlns="" xmlns:a16="http://schemas.microsoft.com/office/drawing/2014/main" id="{9A36EA78-FF2C-400A-9046-7AC3CAE90CA2}"/>
+                <a16:creationId xmlns:a16="http://schemas.microsoft.com/office/drawing/2014/main" xmlns="" id="{9A36EA78-FF2C-400A-9046-7AC3CAE90CA2}"/>
               </a:ext>
             </a:extLst>
           </p:cNvPr>
@@ -12663,7 +13820,7 @@
           <p:cNvPr id="3" name="Content Placeholder 2">
             <a:extLst>
               <a:ext uri="{FF2B5EF4-FFF2-40B4-BE49-F238E27FC236}">
-                <a16:creationId xmlns="" xmlns:a16="http://schemas.microsoft.com/office/drawing/2014/main" id="{70F6B6B6-C76D-431F-B709-7625108E9397}"/>
+                <a16:creationId xmlns:a16="http://schemas.microsoft.com/office/drawing/2014/main" xmlns="" id="{70F6B6B6-C76D-431F-B709-7625108E9397}"/>
               </a:ext>
             </a:extLst>
           </p:cNvPr>
@@ -12720,7 +13877,7 @@
           <p:cNvPr id="6" name="Title 1">
             <a:extLst>
               <a:ext uri="{FF2B5EF4-FFF2-40B4-BE49-F238E27FC236}">
-                <a16:creationId xmlns="" xmlns:a16="http://schemas.microsoft.com/office/drawing/2014/main" id="{DEA5F6D9-707E-463D-9587-37F238C219F4}"/>
+                <a16:creationId xmlns:a16="http://schemas.microsoft.com/office/drawing/2014/main" xmlns="" id="{DEA5F6D9-707E-463D-9587-37F238C219F4}"/>
               </a:ext>
             </a:extLst>
           </p:cNvPr>
@@ -12793,7 +13950,7 @@
           <p:cNvPr id="3" name="Content Placeholder 2">
             <a:extLst>
               <a:ext uri="{FF2B5EF4-FFF2-40B4-BE49-F238E27FC236}">
-                <a16:creationId xmlns="" xmlns:a16="http://schemas.microsoft.com/office/drawing/2014/main" id="{2BD22A1E-7DE1-4B3F-98CF-B728CB60C1C2}"/>
+                <a16:creationId xmlns:a16="http://schemas.microsoft.com/office/drawing/2014/main" xmlns="" id="{2BD22A1E-7DE1-4B3F-98CF-B728CB60C1C2}"/>
               </a:ext>
             </a:extLst>
           </p:cNvPr>
@@ -12879,7 +14036,7 @@
           <p:cNvPr id="4" name="Title 1">
             <a:extLst>
               <a:ext uri="{FF2B5EF4-FFF2-40B4-BE49-F238E27FC236}">
-                <a16:creationId xmlns="" xmlns:a16="http://schemas.microsoft.com/office/drawing/2014/main" id="{1FEEC36F-D87F-422E-8E1D-EC35AF1AB3CC}"/>
+                <a16:creationId xmlns:a16="http://schemas.microsoft.com/office/drawing/2014/main" xmlns="" id="{1FEEC36F-D87F-422E-8E1D-EC35AF1AB3CC}"/>
               </a:ext>
             </a:extLst>
           </p:cNvPr>
@@ -12948,7 +14105,7 @@
           <p:cNvPr id="5" name="Content Placeholder 2">
             <a:extLst>
               <a:ext uri="{FF2B5EF4-FFF2-40B4-BE49-F238E27FC236}">
-                <a16:creationId xmlns="" xmlns:a16="http://schemas.microsoft.com/office/drawing/2014/main" id="{CFE2A543-1F19-4EAA-A07D-E6040095E5DB}"/>
+                <a16:creationId xmlns:a16="http://schemas.microsoft.com/office/drawing/2014/main" xmlns="" id="{CFE2A543-1F19-4EAA-A07D-E6040095E5DB}"/>
               </a:ext>
             </a:extLst>
           </p:cNvPr>
@@ -13274,7 +14431,7 @@
           <p:cNvPr id="6" name="Content Placeholder 2">
             <a:extLst>
               <a:ext uri="{FF2B5EF4-FFF2-40B4-BE49-F238E27FC236}">
-                <a16:creationId xmlns="" xmlns:a16="http://schemas.microsoft.com/office/drawing/2014/main" id="{5162A7B2-6DE7-4ECF-9D72-67D9EA227788}"/>
+                <a16:creationId xmlns:a16="http://schemas.microsoft.com/office/drawing/2014/main" xmlns="" id="{5162A7B2-6DE7-4ECF-9D72-67D9EA227788}"/>
               </a:ext>
             </a:extLst>
           </p:cNvPr>
@@ -13664,7 +14821,7 @@
           <p:cNvPr id="3" name="Content Placeholder 2">
             <a:extLst>
               <a:ext uri="{FF2B5EF4-FFF2-40B4-BE49-F238E27FC236}">
-                <a16:creationId xmlns="" xmlns:a16="http://schemas.microsoft.com/office/drawing/2014/main" id="{B2AC7139-693C-45FB-BF3F-2FED98A01B86}"/>
+                <a16:creationId xmlns:a16="http://schemas.microsoft.com/office/drawing/2014/main" xmlns="" id="{B2AC7139-693C-45FB-BF3F-2FED98A01B86}"/>
               </a:ext>
             </a:extLst>
           </p:cNvPr>
@@ -13779,7 +14936,7 @@
           <p:cNvPr id="5" name="Title 1">
             <a:extLst>
               <a:ext uri="{FF2B5EF4-FFF2-40B4-BE49-F238E27FC236}">
-                <a16:creationId xmlns="" xmlns:a16="http://schemas.microsoft.com/office/drawing/2014/main" id="{C9F3A54F-2754-468D-BEEC-B4EED9A8CD41}"/>
+                <a16:creationId xmlns:a16="http://schemas.microsoft.com/office/drawing/2014/main" xmlns="" id="{C9F3A54F-2754-468D-BEEC-B4EED9A8CD41}"/>
               </a:ext>
             </a:extLst>
           </p:cNvPr>
@@ -13828,7 +14985,7 @@
           <p:cNvPr id="6" name="Content Placeholder 2">
             <a:extLst>
               <a:ext uri="{FF2B5EF4-FFF2-40B4-BE49-F238E27FC236}">
-                <a16:creationId xmlns="" xmlns:a16="http://schemas.microsoft.com/office/drawing/2014/main" id="{B2AC7139-693C-45FB-BF3F-2FED98A01B86}"/>
+                <a16:creationId xmlns:a16="http://schemas.microsoft.com/office/drawing/2014/main" xmlns="" id="{B2AC7139-693C-45FB-BF3F-2FED98A01B86}"/>
               </a:ext>
             </a:extLst>
           </p:cNvPr>

</xml_diff>

<commit_message>
pt1 lecture4 minor fixes
</commit_message>
<xml_diff>
--- a/pt1/lectures/lecture4/lecture4.pptx
+++ b/pt1/lectures/lecture4/lecture4.pptx
@@ -16,7 +16,6 @@
     <p:sldId id="261" r:id="rId10"/>
     <p:sldId id="265" r:id="rId11"/>
     <p:sldId id="266" r:id="rId12"/>
-    <p:sldId id="267" r:id="rId13"/>
   </p:sldIdLst>
   <p:sldSz cx="12192000" cy="6858000"/>
   <p:notesSz cx="6858000" cy="9144000"/>
@@ -7292,1166 +7291,6 @@
 </p:sld>
 </file>
 
-<file path=ppt/slides/slide12.xml><?xml version="1.0" encoding="utf-8"?>
-<p:sld xmlns:a="http://schemas.openxmlformats.org/drawingml/2006/main" xmlns:r="http://schemas.openxmlformats.org/officeDocument/2006/relationships" xmlns:p="http://schemas.openxmlformats.org/presentationml/2006/main">
-  <p:cSld>
-    <p:spTree>
-      <p:nvGrpSpPr>
-        <p:cNvPr id="1" name=""/>
-        <p:cNvGrpSpPr/>
-        <p:nvPr/>
-      </p:nvGrpSpPr>
-      <p:grpSpPr>
-        <a:xfrm>
-          <a:off x="0" y="0"/>
-          <a:ext cx="0" cy="0"/>
-          <a:chOff x="0" y="0"/>
-          <a:chExt cx="0" cy="0"/>
-        </a:xfrm>
-      </p:grpSpPr>
-      <p:sp>
-        <p:nvSpPr>
-          <p:cNvPr id="3" name="Объект 2"/>
-          <p:cNvSpPr>
-            <a:spLocks noGrp="1"/>
-          </p:cNvSpPr>
-          <p:nvPr>
-            <p:ph idx="1"/>
-          </p:nvPr>
-        </p:nvSpPr>
-        <p:spPr>
-          <a:xfrm>
-            <a:off x="7178041" y="990157"/>
-            <a:ext cx="4611505" cy="2201099"/>
-          </a:xfrm>
-          <a:solidFill>
-            <a:schemeClr val="bg1"/>
-          </a:solidFill>
-        </p:spPr>
-        <p:txBody>
-          <a:bodyPr>
-            <a:normAutofit lnSpcReduction="10000"/>
-          </a:bodyPr>
-          <a:lstStyle/>
-          <a:p>
-            <a:r>
-              <a:rPr lang="en-US" sz="1600" dirty="0" smtClean="0"/>
-              <a:t>(1) </a:t>
-            </a:r>
-            <a:r>
-              <a:rPr lang="ru-RU" sz="1600" dirty="0" smtClean="0"/>
-              <a:t>и </a:t>
-            </a:r>
-            <a:r>
-              <a:rPr lang="en-US" sz="1600" dirty="0" smtClean="0"/>
-              <a:t>(2) </a:t>
-            </a:r>
-            <a:r>
-              <a:rPr lang="ru-RU" sz="1600" dirty="0" smtClean="0"/>
-              <a:t>генерируют исключение </a:t>
-            </a:r>
-            <a:r>
-              <a:rPr lang="en-US" sz="1600" dirty="0" err="1" smtClean="0"/>
-              <a:t>std</a:t>
-            </a:r>
-            <a:r>
-              <a:rPr lang="en-US" sz="1600" dirty="0" smtClean="0"/>
-              <a:t>::</a:t>
-            </a:r>
-            <a:r>
-              <a:rPr lang="en-US" sz="1600" dirty="0" err="1" smtClean="0"/>
-              <a:t>bad_alloc</a:t>
-            </a:r>
-            <a:r>
-              <a:rPr lang="en-US" sz="1600" dirty="0" smtClean="0"/>
-              <a:t>, </a:t>
-            </a:r>
-            <a:r>
-              <a:rPr lang="ru-RU" sz="1600" dirty="0" smtClean="0"/>
-              <a:t>если выделить запрошенную память невозможно</a:t>
-            </a:r>
-          </a:p>
-          <a:p>
-            <a:r>
-              <a:rPr lang="ru-RU" sz="1600" dirty="0" smtClean="0"/>
-              <a:t>(3) и (4) в этом случае возвращают </a:t>
-            </a:r>
-            <a:r>
-              <a:rPr lang="en-US" sz="1600" dirty="0" err="1" smtClean="0"/>
-              <a:t>nullptr</a:t>
-            </a:r>
-            <a:r>
-              <a:rPr lang="en-US" sz="1600" dirty="0" smtClean="0"/>
-              <a:t> (non-throwing new)</a:t>
-            </a:r>
-          </a:p>
-          <a:p>
-            <a:r>
-              <a:rPr lang="ru-RU" sz="1600" dirty="0" smtClean="0"/>
-              <a:t>Операторы (2) – (4), как правило, используют оператор (1), поэтому достаточно перегрузить (1)</a:t>
-            </a:r>
-          </a:p>
-        </p:txBody>
-      </p:sp>
-      <p:sp>
-        <p:nvSpPr>
-          <p:cNvPr id="4" name="Title 1">
-            <a:extLst>
-              <a:ext uri="{FF2B5EF4-FFF2-40B4-BE49-F238E27FC236}">
-                <a16:creationId xmlns:a16="http://schemas.microsoft.com/office/drawing/2014/main" xmlns="" id="{C9F3A54F-2754-468D-BEEC-B4EED9A8CD41}"/>
-              </a:ext>
-            </a:extLst>
-          </p:cNvPr>
-          <p:cNvSpPr>
-            <a:spLocks noGrp="1"/>
-          </p:cNvSpPr>
-          <p:nvPr>
-            <p:ph type="title"/>
-          </p:nvPr>
-        </p:nvSpPr>
-        <p:spPr>
-          <a:xfrm>
-            <a:off x="488271" y="164882"/>
-            <a:ext cx="11301275" cy="672661"/>
-          </a:xfrm>
-          <a:solidFill>
-            <a:schemeClr val="bg1"/>
-          </a:solidFill>
-          <a:ln>
-            <a:solidFill>
-              <a:schemeClr val="tx1"/>
-            </a:solidFill>
-          </a:ln>
-        </p:spPr>
-        <p:txBody>
-          <a:bodyPr>
-            <a:noAutofit/>
-          </a:bodyPr>
-          <a:lstStyle/>
-          <a:p>
-            <a:pPr algn="ctr"/>
-            <a:r>
-              <a:rPr lang="ru-RU" sz="2800" dirty="0" smtClean="0"/>
-              <a:t>Перегрузка </a:t>
-            </a:r>
-            <a:r>
-              <a:rPr lang="ru-RU" sz="2800" dirty="0" smtClean="0"/>
-              <a:t>глобальных операторов </a:t>
-            </a:r>
-            <a:r>
-              <a:rPr lang="en-US" sz="2800" dirty="0" smtClean="0"/>
-              <a:t>new </a:t>
-            </a:r>
-            <a:r>
-              <a:rPr lang="ru-RU" sz="2800" dirty="0" smtClean="0"/>
-              <a:t>и </a:t>
-            </a:r>
-            <a:r>
-              <a:rPr lang="en-US" sz="2800" dirty="0" smtClean="0"/>
-              <a:t>delete</a:t>
-            </a:r>
-            <a:endParaRPr lang="en-US" sz="2800" dirty="0"/>
-          </a:p>
-        </p:txBody>
-      </p:sp>
-      <p:pic>
-        <p:nvPicPr>
-          <p:cNvPr id="5" name="Рисунок 4"/>
-          <p:cNvPicPr>
-            <a:picLocks noChangeAspect="1"/>
-          </p:cNvPicPr>
-          <p:nvPr/>
-        </p:nvPicPr>
-        <p:blipFill>
-          <a:blip r:embed="rId2"/>
-          <a:stretch>
-            <a:fillRect/>
-          </a:stretch>
-        </p:blipFill>
-        <p:spPr>
-          <a:xfrm>
-            <a:off x="720512" y="1094273"/>
-            <a:ext cx="6327648" cy="1084516"/>
-          </a:xfrm>
-          <a:prstGeom prst="rect">
-            <a:avLst/>
-          </a:prstGeom>
-        </p:spPr>
-      </p:pic>
-      <p:sp>
-        <p:nvSpPr>
-          <p:cNvPr id="6" name="TextBox 5"/>
-          <p:cNvSpPr txBox="1"/>
-          <p:nvPr/>
-        </p:nvSpPr>
-        <p:spPr>
-          <a:xfrm>
-            <a:off x="488273" y="1106022"/>
-            <a:ext cx="232239" cy="307777"/>
-          </a:xfrm>
-          <a:prstGeom prst="rect">
-            <a:avLst/>
-          </a:prstGeom>
-          <a:noFill/>
-        </p:spPr>
-        <p:txBody>
-          <a:bodyPr wrap="square" rtlCol="0">
-            <a:spAutoFit/>
-          </a:bodyPr>
-          <a:lstStyle/>
-          <a:p>
-            <a:r>
-              <a:rPr lang="en-US" sz="1400" dirty="0" smtClean="0"/>
-              <a:t>1</a:t>
-            </a:r>
-            <a:endParaRPr lang="en-US" sz="1400" dirty="0"/>
-          </a:p>
-        </p:txBody>
-      </p:sp>
-      <p:sp>
-        <p:nvSpPr>
-          <p:cNvPr id="7" name="TextBox 6"/>
-          <p:cNvSpPr txBox="1"/>
-          <p:nvPr/>
-        </p:nvSpPr>
-        <p:spPr>
-          <a:xfrm>
-            <a:off x="488272" y="1377508"/>
-            <a:ext cx="232239" cy="307777"/>
-          </a:xfrm>
-          <a:prstGeom prst="rect">
-            <a:avLst/>
-          </a:prstGeom>
-          <a:noFill/>
-        </p:spPr>
-        <p:txBody>
-          <a:bodyPr wrap="square" rtlCol="0">
-            <a:spAutoFit/>
-          </a:bodyPr>
-          <a:lstStyle/>
-          <a:p>
-            <a:r>
-              <a:rPr lang="en-US" sz="1400" dirty="0" smtClean="0"/>
-              <a:t>2</a:t>
-            </a:r>
-            <a:endParaRPr lang="en-US" sz="1400" dirty="0"/>
-          </a:p>
-        </p:txBody>
-      </p:sp>
-      <p:sp>
-        <p:nvSpPr>
-          <p:cNvPr id="8" name="TextBox 7"/>
-          <p:cNvSpPr txBox="1"/>
-          <p:nvPr/>
-        </p:nvSpPr>
-        <p:spPr>
-          <a:xfrm>
-            <a:off x="488271" y="1631037"/>
-            <a:ext cx="232239" cy="307777"/>
-          </a:xfrm>
-          <a:prstGeom prst="rect">
-            <a:avLst/>
-          </a:prstGeom>
-          <a:noFill/>
-        </p:spPr>
-        <p:txBody>
-          <a:bodyPr wrap="square" rtlCol="0">
-            <a:spAutoFit/>
-          </a:bodyPr>
-          <a:lstStyle/>
-          <a:p>
-            <a:r>
-              <a:rPr lang="en-US" sz="1400" dirty="0" smtClean="0"/>
-              <a:t>3</a:t>
-            </a:r>
-            <a:endParaRPr lang="en-US" sz="1400" dirty="0"/>
-          </a:p>
-        </p:txBody>
-      </p:sp>
-      <p:sp>
-        <p:nvSpPr>
-          <p:cNvPr id="9" name="TextBox 8"/>
-          <p:cNvSpPr txBox="1"/>
-          <p:nvPr/>
-        </p:nvSpPr>
-        <p:spPr>
-          <a:xfrm>
-            <a:off x="488271" y="1871012"/>
-            <a:ext cx="232239" cy="307777"/>
-          </a:xfrm>
-          <a:prstGeom prst="rect">
-            <a:avLst/>
-          </a:prstGeom>
-          <a:noFill/>
-        </p:spPr>
-        <p:txBody>
-          <a:bodyPr wrap="square" rtlCol="0">
-            <a:spAutoFit/>
-          </a:bodyPr>
-          <a:lstStyle/>
-          <a:p>
-            <a:r>
-              <a:rPr lang="en-US" sz="1400" dirty="0" smtClean="0"/>
-              <a:t>4</a:t>
-            </a:r>
-            <a:endParaRPr lang="en-US" sz="1400" dirty="0"/>
-          </a:p>
-        </p:txBody>
-      </p:sp>
-      <p:pic>
-        <p:nvPicPr>
-          <p:cNvPr id="10" name="Рисунок 9"/>
-          <p:cNvPicPr>
-            <a:picLocks noChangeAspect="1"/>
-          </p:cNvPicPr>
-          <p:nvPr/>
-        </p:nvPicPr>
-        <p:blipFill rotWithShape="1">
-          <a:blip r:embed="rId3"/>
-          <a:srcRect b="7746"/>
-          <a:stretch/>
-        </p:blipFill>
-        <p:spPr>
-          <a:xfrm>
-            <a:off x="714176" y="3565826"/>
-            <a:ext cx="6023236" cy="1415844"/>
-          </a:xfrm>
-          <a:prstGeom prst="rect">
-            <a:avLst/>
-          </a:prstGeom>
-        </p:spPr>
-      </p:pic>
-      <p:sp>
-        <p:nvSpPr>
-          <p:cNvPr id="11" name="TextBox 10"/>
-          <p:cNvSpPr txBox="1"/>
-          <p:nvPr/>
-        </p:nvSpPr>
-        <p:spPr>
-          <a:xfrm>
-            <a:off x="481937" y="3649500"/>
-            <a:ext cx="232239" cy="307777"/>
-          </a:xfrm>
-          <a:prstGeom prst="rect">
-            <a:avLst/>
-          </a:prstGeom>
-          <a:noFill/>
-        </p:spPr>
-        <p:txBody>
-          <a:bodyPr wrap="square" rtlCol="0">
-            <a:spAutoFit/>
-          </a:bodyPr>
-          <a:lstStyle/>
-          <a:p>
-            <a:r>
-              <a:rPr lang="en-US" sz="1400" dirty="0" smtClean="0"/>
-              <a:t>1</a:t>
-            </a:r>
-            <a:endParaRPr lang="en-US" sz="1400" dirty="0"/>
-          </a:p>
-        </p:txBody>
-      </p:sp>
-      <p:sp>
-        <p:nvSpPr>
-          <p:cNvPr id="12" name="TextBox 11"/>
-          <p:cNvSpPr txBox="1"/>
-          <p:nvPr/>
-        </p:nvSpPr>
-        <p:spPr>
-          <a:xfrm>
-            <a:off x="481937" y="3869968"/>
-            <a:ext cx="232239" cy="307777"/>
-          </a:xfrm>
-          <a:prstGeom prst="rect">
-            <a:avLst/>
-          </a:prstGeom>
-          <a:noFill/>
-        </p:spPr>
-        <p:txBody>
-          <a:bodyPr wrap="square" rtlCol="0">
-            <a:spAutoFit/>
-          </a:bodyPr>
-          <a:lstStyle/>
-          <a:p>
-            <a:r>
-              <a:rPr lang="en-US" sz="1400" dirty="0" smtClean="0"/>
-              <a:t>2</a:t>
-            </a:r>
-            <a:endParaRPr lang="en-US" sz="1400" dirty="0"/>
-          </a:p>
-        </p:txBody>
-      </p:sp>
-      <p:sp>
-        <p:nvSpPr>
-          <p:cNvPr id="13" name="TextBox 12"/>
-          <p:cNvSpPr txBox="1"/>
-          <p:nvPr/>
-        </p:nvSpPr>
-        <p:spPr>
-          <a:xfrm>
-            <a:off x="481937" y="4074874"/>
-            <a:ext cx="232239" cy="307777"/>
-          </a:xfrm>
-          <a:prstGeom prst="rect">
-            <a:avLst/>
-          </a:prstGeom>
-          <a:noFill/>
-        </p:spPr>
-        <p:txBody>
-          <a:bodyPr wrap="square" rtlCol="0">
-            <a:spAutoFit/>
-          </a:bodyPr>
-          <a:lstStyle/>
-          <a:p>
-            <a:r>
-              <a:rPr lang="en-US" sz="1400" dirty="0" smtClean="0"/>
-              <a:t>3</a:t>
-            </a:r>
-            <a:endParaRPr lang="en-US" sz="1400" dirty="0"/>
-          </a:p>
-        </p:txBody>
-      </p:sp>
-      <p:sp>
-        <p:nvSpPr>
-          <p:cNvPr id="14" name="TextBox 13"/>
-          <p:cNvSpPr txBox="1"/>
-          <p:nvPr/>
-        </p:nvSpPr>
-        <p:spPr>
-          <a:xfrm>
-            <a:off x="481937" y="4295342"/>
-            <a:ext cx="232239" cy="307777"/>
-          </a:xfrm>
-          <a:prstGeom prst="rect">
-            <a:avLst/>
-          </a:prstGeom>
-          <a:noFill/>
-        </p:spPr>
-        <p:txBody>
-          <a:bodyPr wrap="square" rtlCol="0">
-            <a:spAutoFit/>
-          </a:bodyPr>
-          <a:lstStyle/>
-          <a:p>
-            <a:r>
-              <a:rPr lang="en-US" sz="1400" dirty="0" smtClean="0"/>
-              <a:t>4</a:t>
-            </a:r>
-            <a:endParaRPr lang="en-US" sz="1400" dirty="0"/>
-          </a:p>
-        </p:txBody>
-      </p:sp>
-      <p:sp>
-        <p:nvSpPr>
-          <p:cNvPr id="15" name="TextBox 14"/>
-          <p:cNvSpPr txBox="1"/>
-          <p:nvPr/>
-        </p:nvSpPr>
-        <p:spPr>
-          <a:xfrm>
-            <a:off x="481936" y="4484617"/>
-            <a:ext cx="232239" cy="307777"/>
-          </a:xfrm>
-          <a:prstGeom prst="rect">
-            <a:avLst/>
-          </a:prstGeom>
-          <a:noFill/>
-        </p:spPr>
-        <p:txBody>
-          <a:bodyPr wrap="square" rtlCol="0">
-            <a:spAutoFit/>
-          </a:bodyPr>
-          <a:lstStyle/>
-          <a:p>
-            <a:r>
-              <a:rPr lang="en-US" sz="1400" dirty="0"/>
-              <a:t>5</a:t>
-            </a:r>
-            <a:endParaRPr lang="en-US" sz="1400" dirty="0"/>
-          </a:p>
-        </p:txBody>
-      </p:sp>
-      <p:sp>
-        <p:nvSpPr>
-          <p:cNvPr id="16" name="TextBox 15"/>
-          <p:cNvSpPr txBox="1"/>
-          <p:nvPr/>
-        </p:nvSpPr>
-        <p:spPr>
-          <a:xfrm>
-            <a:off x="477317" y="4689523"/>
-            <a:ext cx="232239" cy="307777"/>
-          </a:xfrm>
-          <a:prstGeom prst="rect">
-            <a:avLst/>
-          </a:prstGeom>
-          <a:noFill/>
-        </p:spPr>
-        <p:txBody>
-          <a:bodyPr wrap="square" rtlCol="0">
-            <a:spAutoFit/>
-          </a:bodyPr>
-          <a:lstStyle/>
-          <a:p>
-            <a:r>
-              <a:rPr lang="en-US" sz="1400" dirty="0" smtClean="0"/>
-              <a:t>6</a:t>
-            </a:r>
-            <a:endParaRPr lang="en-US" sz="1400" dirty="0"/>
-          </a:p>
-        </p:txBody>
-      </p:sp>
-      <p:sp>
-        <p:nvSpPr>
-          <p:cNvPr id="17" name="TextBox 16"/>
-          <p:cNvSpPr txBox="1"/>
-          <p:nvPr/>
-        </p:nvSpPr>
-        <p:spPr>
-          <a:xfrm>
-            <a:off x="488271" y="5130459"/>
-            <a:ext cx="6566221" cy="584775"/>
-          </a:xfrm>
-          <a:prstGeom prst="rect">
-            <a:avLst/>
-          </a:prstGeom>
-          <a:noFill/>
-        </p:spPr>
-        <p:txBody>
-          <a:bodyPr wrap="none" rtlCol="0">
-            <a:spAutoFit/>
-          </a:bodyPr>
-          <a:lstStyle/>
-          <a:p>
-            <a:r>
-              <a:rPr lang="ru-RU" sz="1600" dirty="0" smtClean="0"/>
-              <a:t>Подробнее об операторе </a:t>
-            </a:r>
-            <a:r>
-              <a:rPr lang="en-US" sz="1600" dirty="0" smtClean="0"/>
-              <a:t>delete:</a:t>
-            </a:r>
-            <a:br>
-              <a:rPr lang="en-US" sz="1600" dirty="0" smtClean="0"/>
-            </a:br>
-            <a:r>
-              <a:rPr lang="en-US" sz="1600" dirty="0" smtClean="0"/>
-              <a:t>https</a:t>
-            </a:r>
-            <a:r>
-              <a:rPr lang="en-US" sz="1600" dirty="0"/>
-              <a:t>://en.cppreference.com/w/cpp/memory/new/operator_delete</a:t>
-            </a:r>
-          </a:p>
-        </p:txBody>
-      </p:sp>
-      <p:sp>
-        <p:nvSpPr>
-          <p:cNvPr id="18" name="TextBox 17"/>
-          <p:cNvSpPr txBox="1"/>
-          <p:nvPr/>
-        </p:nvSpPr>
-        <p:spPr>
-          <a:xfrm>
-            <a:off x="488271" y="2353690"/>
-            <a:ext cx="6349815" cy="584775"/>
-          </a:xfrm>
-          <a:prstGeom prst="rect">
-            <a:avLst/>
-          </a:prstGeom>
-          <a:noFill/>
-        </p:spPr>
-        <p:txBody>
-          <a:bodyPr wrap="none" rtlCol="0">
-            <a:spAutoFit/>
-          </a:bodyPr>
-          <a:lstStyle/>
-          <a:p>
-            <a:r>
-              <a:rPr lang="ru-RU" sz="1600" dirty="0" smtClean="0"/>
-              <a:t>Подробнее об операторе </a:t>
-            </a:r>
-            <a:r>
-              <a:rPr lang="en-US" sz="1600" dirty="0" smtClean="0"/>
-              <a:t>new</a:t>
-            </a:r>
-          </a:p>
-          <a:p>
-            <a:r>
-              <a:rPr lang="en-US" sz="1600" dirty="0" smtClean="0"/>
-              <a:t>https</a:t>
-            </a:r>
-            <a:r>
-              <a:rPr lang="en-US" sz="1600" dirty="0"/>
-              <a:t>://en.cppreference.com/w/cpp/memory/new/operator_new</a:t>
-            </a:r>
-          </a:p>
-        </p:txBody>
-      </p:sp>
-      <p:sp>
-        <p:nvSpPr>
-          <p:cNvPr id="19" name="Объект 2"/>
-          <p:cNvSpPr txBox="1">
-            <a:spLocks/>
-          </p:cNvSpPr>
-          <p:nvPr/>
-        </p:nvSpPr>
-        <p:spPr>
-          <a:xfrm>
-            <a:off x="7178041" y="3545339"/>
-            <a:ext cx="4611504" cy="2319971"/>
-          </a:xfrm>
-          <a:prstGeom prst="rect">
-            <a:avLst/>
-          </a:prstGeom>
-          <a:solidFill>
-            <a:schemeClr val="bg1"/>
-          </a:solidFill>
-        </p:spPr>
-        <p:txBody>
-          <a:bodyPr vert="horz" lIns="91440" tIns="45720" rIns="91440" bIns="45720" rtlCol="0">
-            <a:normAutofit/>
-          </a:bodyPr>
-          <a:lstStyle>
-            <a:lvl1pPr marL="342900" indent="-342900" algn="l" defTabSz="457200" rtl="0" eaLnBrk="1" latinLnBrk="0" hangingPunct="1">
-              <a:spcBef>
-                <a:spcPts val="1000"/>
-              </a:spcBef>
-              <a:spcAft>
-                <a:spcPts val="0"/>
-              </a:spcAft>
-              <a:buClr>
-                <a:schemeClr val="accent1"/>
-              </a:buClr>
-              <a:buSzPct val="80000"/>
-              <a:buFont typeface="Wingdings 3" charset="2"/>
-              <a:buChar char=""/>
-              <a:defRPr sz="1800" kern="1200">
-                <a:solidFill>
-                  <a:schemeClr val="tx1">
-                    <a:lumMod val="75000"/>
-                    <a:lumOff val="25000"/>
-                  </a:schemeClr>
-                </a:solidFill>
-                <a:latin typeface="+mn-lt"/>
-                <a:ea typeface="+mn-ea"/>
-                <a:cs typeface="+mn-cs"/>
-              </a:defRPr>
-            </a:lvl1pPr>
-            <a:lvl2pPr marL="742950" indent="-285750" algn="l" defTabSz="457200" rtl="0" eaLnBrk="1" latinLnBrk="0" hangingPunct="1">
-              <a:spcBef>
-                <a:spcPts val="1000"/>
-              </a:spcBef>
-              <a:spcAft>
-                <a:spcPts val="0"/>
-              </a:spcAft>
-              <a:buClr>
-                <a:schemeClr val="accent1"/>
-              </a:buClr>
-              <a:buSzPct val="80000"/>
-              <a:buFont typeface="Wingdings 3" charset="2"/>
-              <a:buChar char=""/>
-              <a:defRPr sz="1600" kern="1200">
-                <a:solidFill>
-                  <a:schemeClr val="tx1">
-                    <a:lumMod val="75000"/>
-                    <a:lumOff val="25000"/>
-                  </a:schemeClr>
-                </a:solidFill>
-                <a:latin typeface="+mn-lt"/>
-                <a:ea typeface="+mn-ea"/>
-                <a:cs typeface="+mn-cs"/>
-              </a:defRPr>
-            </a:lvl2pPr>
-            <a:lvl3pPr marL="1143000" indent="-228600" algn="l" defTabSz="457200" rtl="0" eaLnBrk="1" latinLnBrk="0" hangingPunct="1">
-              <a:spcBef>
-                <a:spcPts val="1000"/>
-              </a:spcBef>
-              <a:spcAft>
-                <a:spcPts val="0"/>
-              </a:spcAft>
-              <a:buClr>
-                <a:schemeClr val="accent1"/>
-              </a:buClr>
-              <a:buSzPct val="80000"/>
-              <a:buFont typeface="Wingdings 3" charset="2"/>
-              <a:buChar char=""/>
-              <a:defRPr sz="1400" kern="1200">
-                <a:solidFill>
-                  <a:schemeClr val="tx1">
-                    <a:lumMod val="75000"/>
-                    <a:lumOff val="25000"/>
-                  </a:schemeClr>
-                </a:solidFill>
-                <a:latin typeface="+mn-lt"/>
-                <a:ea typeface="+mn-ea"/>
-                <a:cs typeface="+mn-cs"/>
-              </a:defRPr>
-            </a:lvl3pPr>
-            <a:lvl4pPr marL="1600200" indent="-228600" algn="l" defTabSz="457200" rtl="0" eaLnBrk="1" latinLnBrk="0" hangingPunct="1">
-              <a:spcBef>
-                <a:spcPts val="1000"/>
-              </a:spcBef>
-              <a:spcAft>
-                <a:spcPts val="0"/>
-              </a:spcAft>
-              <a:buClr>
-                <a:schemeClr val="accent1"/>
-              </a:buClr>
-              <a:buSzPct val="80000"/>
-              <a:buFont typeface="Wingdings 3" charset="2"/>
-              <a:buChar char=""/>
-              <a:defRPr sz="1200" kern="1200">
-                <a:solidFill>
-                  <a:schemeClr val="tx1">
-                    <a:lumMod val="75000"/>
-                    <a:lumOff val="25000"/>
-                  </a:schemeClr>
-                </a:solidFill>
-                <a:latin typeface="+mn-lt"/>
-                <a:ea typeface="+mn-ea"/>
-                <a:cs typeface="+mn-cs"/>
-              </a:defRPr>
-            </a:lvl4pPr>
-            <a:lvl5pPr marL="2057400" indent="-228600" algn="l" defTabSz="457200" rtl="0" eaLnBrk="1" latinLnBrk="0" hangingPunct="1">
-              <a:spcBef>
-                <a:spcPts val="1000"/>
-              </a:spcBef>
-              <a:spcAft>
-                <a:spcPts val="0"/>
-              </a:spcAft>
-              <a:buClr>
-                <a:schemeClr val="accent1"/>
-              </a:buClr>
-              <a:buSzPct val="80000"/>
-              <a:buFont typeface="Wingdings 3" charset="2"/>
-              <a:buChar char=""/>
-              <a:defRPr sz="1200" kern="1200">
-                <a:solidFill>
-                  <a:schemeClr val="tx1">
-                    <a:lumMod val="75000"/>
-                    <a:lumOff val="25000"/>
-                  </a:schemeClr>
-                </a:solidFill>
-                <a:latin typeface="+mn-lt"/>
-                <a:ea typeface="+mn-ea"/>
-                <a:cs typeface="+mn-cs"/>
-              </a:defRPr>
-            </a:lvl5pPr>
-            <a:lvl6pPr marL="2514600" indent="-228600" algn="l" defTabSz="457200" rtl="0" eaLnBrk="1" latinLnBrk="0" hangingPunct="1">
-              <a:spcBef>
-                <a:spcPts val="1000"/>
-              </a:spcBef>
-              <a:spcAft>
-                <a:spcPts val="0"/>
-              </a:spcAft>
-              <a:buClr>
-                <a:schemeClr val="accent1"/>
-              </a:buClr>
-              <a:buSzPct val="80000"/>
-              <a:buFont typeface="Wingdings 3" charset="2"/>
-              <a:buChar char=""/>
-              <a:defRPr sz="1200" kern="1200">
-                <a:solidFill>
-                  <a:schemeClr val="tx1">
-                    <a:lumMod val="75000"/>
-                    <a:lumOff val="25000"/>
-                  </a:schemeClr>
-                </a:solidFill>
-                <a:latin typeface="+mn-lt"/>
-                <a:ea typeface="+mn-ea"/>
-                <a:cs typeface="+mn-cs"/>
-              </a:defRPr>
-            </a:lvl6pPr>
-            <a:lvl7pPr marL="2971800" indent="-228600" algn="l" defTabSz="457200" rtl="0" eaLnBrk="1" latinLnBrk="0" hangingPunct="1">
-              <a:spcBef>
-                <a:spcPts val="1000"/>
-              </a:spcBef>
-              <a:spcAft>
-                <a:spcPts val="0"/>
-              </a:spcAft>
-              <a:buClr>
-                <a:schemeClr val="accent1"/>
-              </a:buClr>
-              <a:buSzPct val="80000"/>
-              <a:buFont typeface="Wingdings 3" charset="2"/>
-              <a:buChar char=""/>
-              <a:defRPr sz="1200" kern="1200">
-                <a:solidFill>
-                  <a:schemeClr val="tx1">
-                    <a:lumMod val="75000"/>
-                    <a:lumOff val="25000"/>
-                  </a:schemeClr>
-                </a:solidFill>
-                <a:latin typeface="+mn-lt"/>
-                <a:ea typeface="+mn-ea"/>
-                <a:cs typeface="+mn-cs"/>
-              </a:defRPr>
-            </a:lvl7pPr>
-            <a:lvl8pPr marL="3429000" indent="-228600" algn="l" defTabSz="457200" rtl="0" eaLnBrk="1" latinLnBrk="0" hangingPunct="1">
-              <a:spcBef>
-                <a:spcPts val="1000"/>
-              </a:spcBef>
-              <a:spcAft>
-                <a:spcPts val="0"/>
-              </a:spcAft>
-              <a:buClr>
-                <a:schemeClr val="accent1"/>
-              </a:buClr>
-              <a:buSzPct val="80000"/>
-              <a:buFont typeface="Wingdings 3" charset="2"/>
-              <a:buChar char=""/>
-              <a:defRPr sz="1200" kern="1200">
-                <a:solidFill>
-                  <a:schemeClr val="tx1">
-                    <a:lumMod val="75000"/>
-                    <a:lumOff val="25000"/>
-                  </a:schemeClr>
-                </a:solidFill>
-                <a:latin typeface="+mn-lt"/>
-                <a:ea typeface="+mn-ea"/>
-                <a:cs typeface="+mn-cs"/>
-              </a:defRPr>
-            </a:lvl8pPr>
-            <a:lvl9pPr marL="3886200" indent="-228600" algn="l" defTabSz="457200" rtl="0" eaLnBrk="1" latinLnBrk="0" hangingPunct="1">
-              <a:spcBef>
-                <a:spcPts val="1000"/>
-              </a:spcBef>
-              <a:spcAft>
-                <a:spcPts val="0"/>
-              </a:spcAft>
-              <a:buClr>
-                <a:schemeClr val="accent1"/>
-              </a:buClr>
-              <a:buSzPct val="80000"/>
-              <a:buFont typeface="Wingdings 3" charset="2"/>
-              <a:buChar char=""/>
-              <a:defRPr sz="1200" kern="1200">
-                <a:solidFill>
-                  <a:schemeClr val="tx1">
-                    <a:lumMod val="75000"/>
-                    <a:lumOff val="25000"/>
-                  </a:schemeClr>
-                </a:solidFill>
-                <a:latin typeface="+mn-lt"/>
-                <a:ea typeface="+mn-ea"/>
-                <a:cs typeface="+mn-cs"/>
-              </a:defRPr>
-            </a:lvl9pPr>
-          </a:lstStyle>
-          <a:p>
-            <a:r>
-              <a:rPr lang="ru-RU" sz="1600" dirty="0" smtClean="0"/>
-              <a:t>(3) и (4) вызываются версиями </a:t>
-            </a:r>
-            <a:r>
-              <a:rPr lang="ru-RU" sz="1600" dirty="0"/>
-              <a:t>(3) и (4) </a:t>
-            </a:r>
-            <a:r>
-              <a:rPr lang="ru-RU" sz="1600" dirty="0" smtClean="0"/>
-              <a:t>оператора </a:t>
-            </a:r>
-            <a:r>
-              <a:rPr lang="en-US" sz="1600" dirty="0" smtClean="0"/>
-              <a:t>new</a:t>
-            </a:r>
-            <a:r>
-              <a:rPr lang="ru-RU" sz="1600" dirty="0" smtClean="0"/>
-              <a:t>, если конструктор объекта, для которого такой </a:t>
-            </a:r>
-            <a:r>
-              <a:rPr lang="en-US" sz="1600" dirty="0" smtClean="0"/>
-              <a:t>new </a:t>
-            </a:r>
-            <a:r>
-              <a:rPr lang="ru-RU" sz="1600" dirty="0" smtClean="0"/>
-              <a:t>выделял память, сгенерировал исключение</a:t>
-            </a:r>
-            <a:endParaRPr lang="en-US" sz="1600" dirty="0" smtClean="0"/>
-          </a:p>
-          <a:p>
-            <a:r>
-              <a:rPr lang="ru-RU" sz="1600" dirty="0" smtClean="0"/>
-              <a:t>Как правило достаточно перегрузить (1)</a:t>
-            </a:r>
-            <a:endParaRPr lang="ru-RU" sz="1600" dirty="0" smtClean="0"/>
-          </a:p>
-        </p:txBody>
-      </p:sp>
-      <p:sp>
-        <p:nvSpPr>
-          <p:cNvPr id="20" name="Объект 2"/>
-          <p:cNvSpPr txBox="1">
-            <a:spLocks/>
-          </p:cNvSpPr>
-          <p:nvPr/>
-        </p:nvSpPr>
-        <p:spPr>
-          <a:xfrm>
-            <a:off x="477317" y="5854604"/>
-            <a:ext cx="11312228" cy="730936"/>
-          </a:xfrm>
-          <a:prstGeom prst="rect">
-            <a:avLst/>
-          </a:prstGeom>
-          <a:solidFill>
-            <a:schemeClr val="bg1"/>
-          </a:solidFill>
-        </p:spPr>
-        <p:txBody>
-          <a:bodyPr vert="horz" lIns="91440" tIns="45720" rIns="91440" bIns="45720" rtlCol="0">
-            <a:normAutofit/>
-          </a:bodyPr>
-          <a:lstStyle>
-            <a:lvl1pPr marL="342900" indent="-342900" algn="l" defTabSz="457200" rtl="0" eaLnBrk="1" latinLnBrk="0" hangingPunct="1">
-              <a:spcBef>
-                <a:spcPts val="1000"/>
-              </a:spcBef>
-              <a:spcAft>
-                <a:spcPts val="0"/>
-              </a:spcAft>
-              <a:buClr>
-                <a:schemeClr val="accent1"/>
-              </a:buClr>
-              <a:buSzPct val="80000"/>
-              <a:buFont typeface="Wingdings 3" charset="2"/>
-              <a:buChar char=""/>
-              <a:defRPr sz="1800" kern="1200">
-                <a:solidFill>
-                  <a:schemeClr val="tx1">
-                    <a:lumMod val="75000"/>
-                    <a:lumOff val="25000"/>
-                  </a:schemeClr>
-                </a:solidFill>
-                <a:latin typeface="+mn-lt"/>
-                <a:ea typeface="+mn-ea"/>
-                <a:cs typeface="+mn-cs"/>
-              </a:defRPr>
-            </a:lvl1pPr>
-            <a:lvl2pPr marL="742950" indent="-285750" algn="l" defTabSz="457200" rtl="0" eaLnBrk="1" latinLnBrk="0" hangingPunct="1">
-              <a:spcBef>
-                <a:spcPts val="1000"/>
-              </a:spcBef>
-              <a:spcAft>
-                <a:spcPts val="0"/>
-              </a:spcAft>
-              <a:buClr>
-                <a:schemeClr val="accent1"/>
-              </a:buClr>
-              <a:buSzPct val="80000"/>
-              <a:buFont typeface="Wingdings 3" charset="2"/>
-              <a:buChar char=""/>
-              <a:defRPr sz="1600" kern="1200">
-                <a:solidFill>
-                  <a:schemeClr val="tx1">
-                    <a:lumMod val="75000"/>
-                    <a:lumOff val="25000"/>
-                  </a:schemeClr>
-                </a:solidFill>
-                <a:latin typeface="+mn-lt"/>
-                <a:ea typeface="+mn-ea"/>
-                <a:cs typeface="+mn-cs"/>
-              </a:defRPr>
-            </a:lvl2pPr>
-            <a:lvl3pPr marL="1143000" indent="-228600" algn="l" defTabSz="457200" rtl="0" eaLnBrk="1" latinLnBrk="0" hangingPunct="1">
-              <a:spcBef>
-                <a:spcPts val="1000"/>
-              </a:spcBef>
-              <a:spcAft>
-                <a:spcPts val="0"/>
-              </a:spcAft>
-              <a:buClr>
-                <a:schemeClr val="accent1"/>
-              </a:buClr>
-              <a:buSzPct val="80000"/>
-              <a:buFont typeface="Wingdings 3" charset="2"/>
-              <a:buChar char=""/>
-              <a:defRPr sz="1400" kern="1200">
-                <a:solidFill>
-                  <a:schemeClr val="tx1">
-                    <a:lumMod val="75000"/>
-                    <a:lumOff val="25000"/>
-                  </a:schemeClr>
-                </a:solidFill>
-                <a:latin typeface="+mn-lt"/>
-                <a:ea typeface="+mn-ea"/>
-                <a:cs typeface="+mn-cs"/>
-              </a:defRPr>
-            </a:lvl3pPr>
-            <a:lvl4pPr marL="1600200" indent="-228600" algn="l" defTabSz="457200" rtl="0" eaLnBrk="1" latinLnBrk="0" hangingPunct="1">
-              <a:spcBef>
-                <a:spcPts val="1000"/>
-              </a:spcBef>
-              <a:spcAft>
-                <a:spcPts val="0"/>
-              </a:spcAft>
-              <a:buClr>
-                <a:schemeClr val="accent1"/>
-              </a:buClr>
-              <a:buSzPct val="80000"/>
-              <a:buFont typeface="Wingdings 3" charset="2"/>
-              <a:buChar char=""/>
-              <a:defRPr sz="1200" kern="1200">
-                <a:solidFill>
-                  <a:schemeClr val="tx1">
-                    <a:lumMod val="75000"/>
-                    <a:lumOff val="25000"/>
-                  </a:schemeClr>
-                </a:solidFill>
-                <a:latin typeface="+mn-lt"/>
-                <a:ea typeface="+mn-ea"/>
-                <a:cs typeface="+mn-cs"/>
-              </a:defRPr>
-            </a:lvl4pPr>
-            <a:lvl5pPr marL="2057400" indent="-228600" algn="l" defTabSz="457200" rtl="0" eaLnBrk="1" latinLnBrk="0" hangingPunct="1">
-              <a:spcBef>
-                <a:spcPts val="1000"/>
-              </a:spcBef>
-              <a:spcAft>
-                <a:spcPts val="0"/>
-              </a:spcAft>
-              <a:buClr>
-                <a:schemeClr val="accent1"/>
-              </a:buClr>
-              <a:buSzPct val="80000"/>
-              <a:buFont typeface="Wingdings 3" charset="2"/>
-              <a:buChar char=""/>
-              <a:defRPr sz="1200" kern="1200">
-                <a:solidFill>
-                  <a:schemeClr val="tx1">
-                    <a:lumMod val="75000"/>
-                    <a:lumOff val="25000"/>
-                  </a:schemeClr>
-                </a:solidFill>
-                <a:latin typeface="+mn-lt"/>
-                <a:ea typeface="+mn-ea"/>
-                <a:cs typeface="+mn-cs"/>
-              </a:defRPr>
-            </a:lvl5pPr>
-            <a:lvl6pPr marL="2514600" indent="-228600" algn="l" defTabSz="457200" rtl="0" eaLnBrk="1" latinLnBrk="0" hangingPunct="1">
-              <a:spcBef>
-                <a:spcPts val="1000"/>
-              </a:spcBef>
-              <a:spcAft>
-                <a:spcPts val="0"/>
-              </a:spcAft>
-              <a:buClr>
-                <a:schemeClr val="accent1"/>
-              </a:buClr>
-              <a:buSzPct val="80000"/>
-              <a:buFont typeface="Wingdings 3" charset="2"/>
-              <a:buChar char=""/>
-              <a:defRPr sz="1200" kern="1200">
-                <a:solidFill>
-                  <a:schemeClr val="tx1">
-                    <a:lumMod val="75000"/>
-                    <a:lumOff val="25000"/>
-                  </a:schemeClr>
-                </a:solidFill>
-                <a:latin typeface="+mn-lt"/>
-                <a:ea typeface="+mn-ea"/>
-                <a:cs typeface="+mn-cs"/>
-              </a:defRPr>
-            </a:lvl6pPr>
-            <a:lvl7pPr marL="2971800" indent="-228600" algn="l" defTabSz="457200" rtl="0" eaLnBrk="1" latinLnBrk="0" hangingPunct="1">
-              <a:spcBef>
-                <a:spcPts val="1000"/>
-              </a:spcBef>
-              <a:spcAft>
-                <a:spcPts val="0"/>
-              </a:spcAft>
-              <a:buClr>
-                <a:schemeClr val="accent1"/>
-              </a:buClr>
-              <a:buSzPct val="80000"/>
-              <a:buFont typeface="Wingdings 3" charset="2"/>
-              <a:buChar char=""/>
-              <a:defRPr sz="1200" kern="1200">
-                <a:solidFill>
-                  <a:schemeClr val="tx1">
-                    <a:lumMod val="75000"/>
-                    <a:lumOff val="25000"/>
-                  </a:schemeClr>
-                </a:solidFill>
-                <a:latin typeface="+mn-lt"/>
-                <a:ea typeface="+mn-ea"/>
-                <a:cs typeface="+mn-cs"/>
-              </a:defRPr>
-            </a:lvl7pPr>
-            <a:lvl8pPr marL="3429000" indent="-228600" algn="l" defTabSz="457200" rtl="0" eaLnBrk="1" latinLnBrk="0" hangingPunct="1">
-              <a:spcBef>
-                <a:spcPts val="1000"/>
-              </a:spcBef>
-              <a:spcAft>
-                <a:spcPts val="0"/>
-              </a:spcAft>
-              <a:buClr>
-                <a:schemeClr val="accent1"/>
-              </a:buClr>
-              <a:buSzPct val="80000"/>
-              <a:buFont typeface="Wingdings 3" charset="2"/>
-              <a:buChar char=""/>
-              <a:defRPr sz="1200" kern="1200">
-                <a:solidFill>
-                  <a:schemeClr val="tx1">
-                    <a:lumMod val="75000"/>
-                    <a:lumOff val="25000"/>
-                  </a:schemeClr>
-                </a:solidFill>
-                <a:latin typeface="+mn-lt"/>
-                <a:ea typeface="+mn-ea"/>
-                <a:cs typeface="+mn-cs"/>
-              </a:defRPr>
-            </a:lvl8pPr>
-            <a:lvl9pPr marL="3886200" indent="-228600" algn="l" defTabSz="457200" rtl="0" eaLnBrk="1" latinLnBrk="0" hangingPunct="1">
-              <a:spcBef>
-                <a:spcPts val="1000"/>
-              </a:spcBef>
-              <a:spcAft>
-                <a:spcPts val="0"/>
-              </a:spcAft>
-              <a:buClr>
-                <a:schemeClr val="accent1"/>
-              </a:buClr>
-              <a:buSzPct val="80000"/>
-              <a:buFont typeface="Wingdings 3" charset="2"/>
-              <a:buChar char=""/>
-              <a:defRPr sz="1200" kern="1200">
-                <a:solidFill>
-                  <a:schemeClr val="tx1">
-                    <a:lumMod val="75000"/>
-                    <a:lumOff val="25000"/>
-                  </a:schemeClr>
-                </a:solidFill>
-                <a:latin typeface="+mn-lt"/>
-                <a:ea typeface="+mn-ea"/>
-                <a:cs typeface="+mn-cs"/>
-              </a:defRPr>
-            </a:lvl9pPr>
-          </a:lstStyle>
-          <a:p>
-            <a:r>
-              <a:rPr lang="ru-RU" sz="1600" dirty="0" smtClean="0"/>
-              <a:t>Вариант применения: отслеживание утечек памяти</a:t>
-            </a:r>
-            <a:endParaRPr lang="en-US" sz="1600" dirty="0" smtClean="0"/>
-          </a:p>
-        </p:txBody>
-      </p:sp>
-    </p:spTree>
-    <p:extLst>
-      <p:ext uri="{BB962C8B-B14F-4D97-AF65-F5344CB8AC3E}">
-        <p14:creationId xmlns:p14="http://schemas.microsoft.com/office/powerpoint/2010/main" val="4048409101"/>
-      </p:ext>
-    </p:extLst>
-  </p:cSld>
-  <p:clrMapOvr>
-    <a:masterClrMapping/>
-  </p:clrMapOvr>
-</p:sld>
-</file>
-
 <file path=ppt/slides/slide2.xml><?xml version="1.0" encoding="utf-8"?>
 <p:sld xmlns:a="http://schemas.openxmlformats.org/drawingml/2006/main" xmlns:r="http://schemas.openxmlformats.org/officeDocument/2006/relationships" xmlns:p="http://schemas.openxmlformats.org/presentationml/2006/main">
   <p:cSld>

</xml_diff>